<commit_message>
Added query  algorithm, benchmark and overhead results
</commit_message>
<xml_diff>
--- a/C/Tree_2k/tree_2k.pptx
+++ b/C/Tree_2k/tree_2k.pptx
@@ -10,6 +10,10 @@
     <p:sldId id="258" r:id="rId4"/>
     <p:sldId id="259" r:id="rId5"/>
     <p:sldId id="260" r:id="rId6"/>
+    <p:sldId id="261" r:id="rId7"/>
+    <p:sldId id="262" r:id="rId8"/>
+    <p:sldId id="263" r:id="rId9"/>
+    <p:sldId id="264" r:id="rId10"/>
   </p:sldIdLst>
   <p:sldSz cx="9144000" cy="6858000" type="screen4x3"/>
   <p:notesSz cx="6858000" cy="9144000"/>
@@ -4284,7 +4288,9 @@
         </p:nvSpPr>
         <p:spPr/>
         <p:txBody>
-          <a:bodyPr/>
+          <a:bodyPr>
+            <a:normAutofit lnSpcReduction="10000"/>
+          </a:bodyPr>
           <a:lstStyle/>
           <a:p>
             <a:r>
@@ -4428,13 +4434,58 @@
             <a:endParaRPr lang="en-US" dirty="0"/>
           </a:p>
           <a:p>
-            <a:endParaRPr lang="en-US" dirty="0" smtClean="0"/>
-          </a:p>
-          <a:p>
             <a:r>
               <a:rPr lang="en-US" dirty="0" smtClean="0"/>
-              <a:t>Too expensive in, e.g., many body simulations</a:t>
-            </a:r>
+              <a:t>Too </a:t>
+            </a:r>
+            <a:r>
+              <a:rPr lang="en-US" dirty="0" smtClean="0"/>
+              <a:t>expensive in, e.g., many body </a:t>
+            </a:r>
+            <a:r>
+              <a:rPr lang="en-US" dirty="0" smtClean="0"/>
+              <a:t>simulations</a:t>
+            </a:r>
+          </a:p>
+          <a:p>
+            <a:r>
+              <a:rPr lang="en-US" dirty="0" smtClean="0"/>
+              <a:t>Better: in </a:t>
+            </a:r>
+            <a:r>
+              <a:rPr lang="en-US" dirty="0"/>
+              <a:t>2D, use quad-tree; In 3D, use </a:t>
+            </a:r>
+            <a:r>
+              <a:rPr lang="en-US" dirty="0" err="1"/>
+              <a:t>octo</a:t>
+            </a:r>
+            <a:r>
+              <a:rPr lang="en-US" dirty="0"/>
+              <a:t>-tree; In </a:t>
+            </a:r>
+            <a:r>
+              <a:rPr lang="en-US" i="1" dirty="0" err="1"/>
+              <a:t>k</a:t>
+            </a:r>
+            <a:r>
+              <a:rPr lang="en-US" dirty="0" err="1"/>
+              <a:t>D</a:t>
+            </a:r>
+            <a:r>
+              <a:rPr lang="en-US" dirty="0"/>
+              <a:t>, use 2</a:t>
+            </a:r>
+            <a:r>
+              <a:rPr lang="en-US" i="1" baseline="30000" dirty="0"/>
+              <a:t>k</a:t>
+            </a:r>
+            <a:r>
+              <a:rPr lang="en-US" dirty="0"/>
+              <a:t>-tree</a:t>
+            </a:r>
+          </a:p>
+          <a:p>
             <a:endParaRPr lang="en-US" dirty="0"/>
           </a:p>
         </p:txBody>
@@ -4447,7 +4498,7 @@
         </p:nvSpPr>
         <p:spPr>
           <a:xfrm>
-            <a:off x="3099067" y="4429780"/>
+            <a:off x="3099067" y="3972580"/>
             <a:ext cx="3240246" cy="523220"/>
           </a:xfrm>
           <a:prstGeom prst="rect">
@@ -4745,6 +4796,55 @@
                                         <p:tgtEl>
                                           <p:spTgt spid="3">
                                             <p:txEl>
+                                              <p:pRg st="6" end="6"/>
+                                            </p:txEl>
+                                          </p:spTgt>
+                                        </p:tgtEl>
+                                        <p:attrNameLst>
+                                          <p:attrName>style.visibility</p:attrName>
+                                        </p:attrNameLst>
+                                      </p:cBhvr>
+                                      <p:to>
+                                        <p:strVal val="visible"/>
+                                      </p:to>
+                                    </p:set>
+                                  </p:childTnLst>
+                                </p:cTn>
+                              </p:par>
+                            </p:childTnLst>
+                          </p:cTn>
+                        </p:par>
+                      </p:childTnLst>
+                    </p:cTn>
+                  </p:par>
+                  <p:par>
+                    <p:cTn id="23" fill="hold">
+                      <p:stCondLst>
+                        <p:cond delay="indefinite"/>
+                      </p:stCondLst>
+                      <p:childTnLst>
+                        <p:par>
+                          <p:cTn id="24" fill="hold">
+                            <p:stCondLst>
+                              <p:cond delay="0"/>
+                            </p:stCondLst>
+                            <p:childTnLst>
+                              <p:par>
+                                <p:cTn id="25" presetID="1" presetClass="entr" presetSubtype="0" fill="hold" grpId="0" nodeType="clickEffect">
+                                  <p:stCondLst>
+                                    <p:cond delay="0"/>
+                                  </p:stCondLst>
+                                  <p:childTnLst>
+                                    <p:set>
+                                      <p:cBhvr>
+                                        <p:cTn id="26" dur="1" fill="hold">
+                                          <p:stCondLst>
+                                            <p:cond delay="0"/>
+                                          </p:stCondLst>
+                                        </p:cTn>
+                                        <p:tgtEl>
+                                          <p:spTgt spid="3">
+                                            <p:txEl>
                                               <p:pRg st="7" end="7"/>
                                             </p:txEl>
                                           </p:spTgt>
@@ -4829,7 +4929,7 @@
           <a:p>
             <a:r>
               <a:rPr lang="en-US" dirty="0" smtClean="0"/>
-              <a:t>Better algorithm</a:t>
+              <a:t>Tree building algorithm</a:t>
             </a:r>
             <a:endParaRPr lang="nl-BE" dirty="0"/>
           </a:p>
@@ -4852,52 +4952,28 @@
           <a:p>
             <a:r>
               <a:rPr lang="en-US" dirty="0" smtClean="0"/>
-              <a:t>In 2D, use quad-tree; In 3D, use </a:t>
-            </a:r>
-            <a:r>
-              <a:rPr lang="en-US" dirty="0" err="1" smtClean="0"/>
-              <a:t>octo</a:t>
+              <a:t>E.g</a:t>
             </a:r>
             <a:r>
               <a:rPr lang="en-US" dirty="0" smtClean="0"/>
-              <a:t>-tree; In </a:t>
-            </a:r>
-            <a:r>
-              <a:rPr lang="en-US" i="1" dirty="0" err="1" smtClean="0"/>
-              <a:t>k</a:t>
-            </a:r>
-            <a:r>
-              <a:rPr lang="en-US" dirty="0" err="1" smtClean="0"/>
-              <a:t>D</a:t>
+              <a:t>., 2D </a:t>
             </a:r>
             <a:r>
               <a:rPr lang="en-US" dirty="0" smtClean="0"/>
-              <a:t>, use 2</a:t>
-            </a:r>
-            <a:r>
-              <a:rPr lang="en-US" i="1" baseline="30000" dirty="0" smtClean="0"/>
-              <a:t>k</a:t>
-            </a:r>
+              <a:t>initialization</a:t>
+            </a:r>
+          </a:p>
+          <a:p>
             <a:r>
               <a:rPr lang="en-US" dirty="0" smtClean="0"/>
-              <a:t>-tree</a:t>
-            </a:r>
-          </a:p>
-          <a:p>
+              <a:t>initialize </a:t>
+            </a:r>
             <a:r>
               <a:rPr lang="en-US" dirty="0" smtClean="0"/>
-              <a:t>E.g., 2D initialization</a:t>
-            </a:r>
-          </a:p>
-          <a:p>
-            <a:pPr lvl="1"/>
-            <a:r>
-              <a:rPr lang="en-US" dirty="0" smtClean="0"/>
-              <a:t>initialize tree with one empty region</a:t>
-            </a:r>
-          </a:p>
-          <a:p>
-            <a:pPr lvl="1"/>
+              <a:t>tree with one empty region</a:t>
+            </a:r>
+          </a:p>
+          <a:p>
             <a:r>
               <a:rPr lang="en-US" dirty="0" smtClean="0"/>
               <a:t>for each </a:t>
@@ -4916,14 +4992,14 @@
             </a:r>
           </a:p>
           <a:p>
-            <a:pPr lvl="2"/>
+            <a:pPr lvl="1"/>
             <a:r>
               <a:rPr lang="en-US" dirty="0" smtClean="0"/>
               <a:t>add it to region</a:t>
             </a:r>
           </a:p>
           <a:p>
-            <a:pPr lvl="3"/>
+            <a:pPr lvl="2"/>
             <a:r>
               <a:rPr lang="en-US" dirty="0" smtClean="0"/>
               <a:t>if region has </a:t>
@@ -4943,7 +5019,7 @@
             <a:endParaRPr lang="en-US" dirty="0" smtClean="0"/>
           </a:p>
           <a:p>
-            <a:pPr lvl="3"/>
+            <a:pPr lvl="2"/>
             <a:r>
               <a:rPr lang="en-US" dirty="0" smtClean="0"/>
               <a:t>else if region is "full", split region into 4 new </a:t>
@@ -4955,7 +5031,7 @@
             <a:endParaRPr lang="en-US" dirty="0" smtClean="0"/>
           </a:p>
           <a:p>
-            <a:pPr lvl="3"/>
+            <a:pPr lvl="2"/>
             <a:r>
               <a:rPr lang="en-US" dirty="0" smtClean="0"/>
               <a:t>else add it to bucket</a:t>
@@ -5051,7 +5127,7 @@
           <a:p>
             <a:r>
               <a:rPr lang="en-US" dirty="0" smtClean="0"/>
-              <a:t>Illustration</a:t>
+              <a:t>Illustration of building tree</a:t>
             </a:r>
             <a:endParaRPr lang="nl-BE" dirty="0"/>
           </a:p>
@@ -7543,6 +7619,2524 @@
 </p:sld>
 </file>
 
+<file path=ppt/slides/slide6.xml><?xml version="1.0" encoding="utf-8"?>
+<p:sld xmlns:a="http://schemas.openxmlformats.org/drawingml/2006/main" xmlns:r="http://schemas.openxmlformats.org/officeDocument/2006/relationships" xmlns:p="http://schemas.openxmlformats.org/presentationml/2006/main">
+  <p:cSld>
+    <p:spTree>
+      <p:nvGrpSpPr>
+        <p:cNvPr id="1" name=""/>
+        <p:cNvGrpSpPr/>
+        <p:nvPr/>
+      </p:nvGrpSpPr>
+      <p:grpSpPr>
+        <a:xfrm>
+          <a:off x="0" y="0"/>
+          <a:ext cx="0" cy="0"/>
+          <a:chOff x="0" y="0"/>
+          <a:chExt cx="0" cy="0"/>
+        </a:xfrm>
+      </p:grpSpPr>
+      <p:sp>
+        <p:nvSpPr>
+          <p:cNvPr id="2" name="Title 1"/>
+          <p:cNvSpPr>
+            <a:spLocks noGrp="1"/>
+          </p:cNvSpPr>
+          <p:nvPr>
+            <p:ph type="title"/>
+          </p:nvPr>
+        </p:nvSpPr>
+        <p:spPr/>
+        <p:txBody>
+          <a:bodyPr/>
+          <a:lstStyle/>
+          <a:p>
+            <a:r>
+              <a:rPr lang="en-US" dirty="0" smtClean="0"/>
+              <a:t>What's the point?</a:t>
+            </a:r>
+            <a:endParaRPr lang="nl-BE" dirty="0"/>
+          </a:p>
+        </p:txBody>
+      </p:sp>
+      <p:sp>
+        <p:nvSpPr>
+          <p:cNvPr id="3" name="Content Placeholder 2"/>
+          <p:cNvSpPr>
+            <a:spLocks noGrp="1"/>
+          </p:cNvSpPr>
+          <p:nvPr>
+            <p:ph idx="1"/>
+          </p:nvPr>
+        </p:nvSpPr>
+        <p:spPr/>
+        <p:txBody>
+          <a:bodyPr/>
+          <a:lstStyle/>
+          <a:p>
+            <a:r>
+              <a:rPr lang="en-US" dirty="0" smtClean="0"/>
+              <a:t>Pun intended…</a:t>
+            </a:r>
+          </a:p>
+          <a:p>
+            <a:r>
+              <a:rPr lang="en-US" dirty="0" smtClean="0"/>
+              <a:t>Queries are fast!</a:t>
+            </a:r>
+            <a:endParaRPr lang="nl-BE" dirty="0"/>
+          </a:p>
+        </p:txBody>
+      </p:sp>
+      <p:sp>
+        <p:nvSpPr>
+          <p:cNvPr id="4" name="Oval 3"/>
+          <p:cNvSpPr>
+            <a:spLocks noChangeAspect="1"/>
+          </p:cNvSpPr>
+          <p:nvPr/>
+        </p:nvSpPr>
+        <p:spPr>
+          <a:xfrm>
+            <a:off x="2438400" y="3581400"/>
+            <a:ext cx="72000" cy="72000"/>
+          </a:xfrm>
+          <a:prstGeom prst="ellipse">
+            <a:avLst/>
+          </a:prstGeom>
+          <a:solidFill>
+            <a:schemeClr val="tx1"/>
+          </a:solidFill>
+          <a:ln>
+            <a:solidFill>
+              <a:schemeClr val="tx1"/>
+            </a:solidFill>
+          </a:ln>
+        </p:spPr>
+        <p:style>
+          <a:lnRef idx="2">
+            <a:schemeClr val="accent1">
+              <a:shade val="50000"/>
+            </a:schemeClr>
+          </a:lnRef>
+          <a:fillRef idx="1">
+            <a:schemeClr val="accent1"/>
+          </a:fillRef>
+          <a:effectRef idx="0">
+            <a:schemeClr val="accent1"/>
+          </a:effectRef>
+          <a:fontRef idx="minor">
+            <a:schemeClr val="lt1"/>
+          </a:fontRef>
+        </p:style>
+        <p:txBody>
+          <a:bodyPr rtlCol="0" anchor="ctr"/>
+          <a:lstStyle/>
+          <a:p>
+            <a:pPr algn="ctr"/>
+            <a:endParaRPr lang="nl-BE"/>
+          </a:p>
+        </p:txBody>
+      </p:sp>
+      <p:sp>
+        <p:nvSpPr>
+          <p:cNvPr id="5" name="Oval 4"/>
+          <p:cNvSpPr>
+            <a:spLocks noChangeAspect="1"/>
+          </p:cNvSpPr>
+          <p:nvPr/>
+        </p:nvSpPr>
+        <p:spPr>
+          <a:xfrm>
+            <a:off x="1524000" y="4648200"/>
+            <a:ext cx="72000" cy="72000"/>
+          </a:xfrm>
+          <a:prstGeom prst="ellipse">
+            <a:avLst/>
+          </a:prstGeom>
+          <a:solidFill>
+            <a:schemeClr val="tx1"/>
+          </a:solidFill>
+          <a:ln>
+            <a:solidFill>
+              <a:schemeClr val="tx1"/>
+            </a:solidFill>
+          </a:ln>
+        </p:spPr>
+        <p:style>
+          <a:lnRef idx="2">
+            <a:schemeClr val="accent1">
+              <a:shade val="50000"/>
+            </a:schemeClr>
+          </a:lnRef>
+          <a:fillRef idx="1">
+            <a:schemeClr val="accent1"/>
+          </a:fillRef>
+          <a:effectRef idx="0">
+            <a:schemeClr val="accent1"/>
+          </a:effectRef>
+          <a:fontRef idx="minor">
+            <a:schemeClr val="lt1"/>
+          </a:fontRef>
+        </p:style>
+        <p:txBody>
+          <a:bodyPr rtlCol="0" anchor="ctr"/>
+          <a:lstStyle/>
+          <a:p>
+            <a:pPr algn="ctr"/>
+            <a:endParaRPr lang="nl-BE"/>
+          </a:p>
+        </p:txBody>
+      </p:sp>
+      <p:sp>
+        <p:nvSpPr>
+          <p:cNvPr id="6" name="Oval 5"/>
+          <p:cNvSpPr>
+            <a:spLocks noChangeAspect="1"/>
+          </p:cNvSpPr>
+          <p:nvPr/>
+        </p:nvSpPr>
+        <p:spPr>
+          <a:xfrm>
+            <a:off x="2590800" y="3733800"/>
+            <a:ext cx="72000" cy="72000"/>
+          </a:xfrm>
+          <a:prstGeom prst="ellipse">
+            <a:avLst/>
+          </a:prstGeom>
+          <a:solidFill>
+            <a:schemeClr val="tx1"/>
+          </a:solidFill>
+          <a:ln>
+            <a:solidFill>
+              <a:schemeClr val="tx1"/>
+            </a:solidFill>
+          </a:ln>
+        </p:spPr>
+        <p:style>
+          <a:lnRef idx="2">
+            <a:schemeClr val="accent1">
+              <a:shade val="50000"/>
+            </a:schemeClr>
+          </a:lnRef>
+          <a:fillRef idx="1">
+            <a:schemeClr val="accent1"/>
+          </a:fillRef>
+          <a:effectRef idx="0">
+            <a:schemeClr val="accent1"/>
+          </a:effectRef>
+          <a:fontRef idx="minor">
+            <a:schemeClr val="lt1"/>
+          </a:fontRef>
+        </p:style>
+        <p:txBody>
+          <a:bodyPr rtlCol="0" anchor="ctr"/>
+          <a:lstStyle/>
+          <a:p>
+            <a:pPr algn="ctr"/>
+            <a:endParaRPr lang="nl-BE"/>
+          </a:p>
+        </p:txBody>
+      </p:sp>
+      <p:grpSp>
+        <p:nvGrpSpPr>
+          <p:cNvPr id="32" name="Group 31"/>
+          <p:cNvGrpSpPr/>
+          <p:nvPr/>
+        </p:nvGrpSpPr>
+        <p:grpSpPr>
+          <a:xfrm>
+            <a:off x="3276600" y="3429000"/>
+            <a:ext cx="1215000" cy="842400"/>
+            <a:chOff x="3276600" y="3429000"/>
+            <a:chExt cx="1215000" cy="842400"/>
+          </a:xfrm>
+        </p:grpSpPr>
+        <p:sp>
+          <p:nvSpPr>
+            <p:cNvPr id="7" name="Oval 6"/>
+            <p:cNvSpPr>
+              <a:spLocks noChangeAspect="1"/>
+            </p:cNvSpPr>
+            <p:nvPr/>
+          </p:nvSpPr>
+          <p:spPr>
+            <a:xfrm>
+              <a:off x="3276600" y="3653400"/>
+              <a:ext cx="72000" cy="72000"/>
+            </a:xfrm>
+            <a:prstGeom prst="ellipse">
+              <a:avLst/>
+            </a:prstGeom>
+            <a:solidFill>
+              <a:schemeClr val="tx1"/>
+            </a:solidFill>
+            <a:ln>
+              <a:solidFill>
+                <a:schemeClr val="tx1"/>
+              </a:solidFill>
+            </a:ln>
+          </p:spPr>
+          <p:style>
+            <a:lnRef idx="2">
+              <a:schemeClr val="accent1">
+                <a:shade val="50000"/>
+              </a:schemeClr>
+            </a:lnRef>
+            <a:fillRef idx="1">
+              <a:schemeClr val="accent1"/>
+            </a:fillRef>
+            <a:effectRef idx="0">
+              <a:schemeClr val="accent1"/>
+            </a:effectRef>
+            <a:fontRef idx="minor">
+              <a:schemeClr val="lt1"/>
+            </a:fontRef>
+          </p:style>
+          <p:txBody>
+            <a:bodyPr rtlCol="0" anchor="ctr"/>
+            <a:lstStyle/>
+            <a:p>
+              <a:pPr algn="ctr"/>
+              <a:endParaRPr lang="nl-BE"/>
+            </a:p>
+          </p:txBody>
+        </p:sp>
+        <p:sp>
+          <p:nvSpPr>
+            <p:cNvPr id="8" name="Oval 7"/>
+            <p:cNvSpPr>
+              <a:spLocks noChangeAspect="1"/>
+            </p:cNvSpPr>
+            <p:nvPr/>
+          </p:nvSpPr>
+          <p:spPr>
+            <a:xfrm>
+              <a:off x="3617400" y="3617400"/>
+              <a:ext cx="72000" cy="72000"/>
+            </a:xfrm>
+            <a:prstGeom prst="ellipse">
+              <a:avLst/>
+            </a:prstGeom>
+            <a:solidFill>
+              <a:schemeClr val="tx1"/>
+            </a:solidFill>
+            <a:ln>
+              <a:solidFill>
+                <a:schemeClr val="tx1"/>
+              </a:solidFill>
+            </a:ln>
+          </p:spPr>
+          <p:style>
+            <a:lnRef idx="2">
+              <a:schemeClr val="accent1">
+                <a:shade val="50000"/>
+              </a:schemeClr>
+            </a:lnRef>
+            <a:fillRef idx="1">
+              <a:schemeClr val="accent1"/>
+            </a:fillRef>
+            <a:effectRef idx="0">
+              <a:schemeClr val="accent1"/>
+            </a:effectRef>
+            <a:fontRef idx="minor">
+              <a:schemeClr val="lt1"/>
+            </a:fontRef>
+          </p:style>
+          <p:txBody>
+            <a:bodyPr rtlCol="0" anchor="ctr"/>
+            <a:lstStyle/>
+            <a:p>
+              <a:pPr algn="ctr"/>
+              <a:endParaRPr lang="nl-BE"/>
+            </a:p>
+          </p:txBody>
+        </p:sp>
+        <p:sp>
+          <p:nvSpPr>
+            <p:cNvPr id="9" name="Oval 8"/>
+            <p:cNvSpPr>
+              <a:spLocks noChangeAspect="1"/>
+            </p:cNvSpPr>
+            <p:nvPr/>
+          </p:nvSpPr>
+          <p:spPr>
+            <a:xfrm>
+              <a:off x="3676281" y="4199400"/>
+              <a:ext cx="72000" cy="72000"/>
+            </a:xfrm>
+            <a:prstGeom prst="ellipse">
+              <a:avLst/>
+            </a:prstGeom>
+            <a:solidFill>
+              <a:schemeClr val="tx1"/>
+            </a:solidFill>
+            <a:ln>
+              <a:solidFill>
+                <a:schemeClr val="tx1"/>
+              </a:solidFill>
+            </a:ln>
+          </p:spPr>
+          <p:style>
+            <a:lnRef idx="2">
+              <a:schemeClr val="accent1">
+                <a:shade val="50000"/>
+              </a:schemeClr>
+            </a:lnRef>
+            <a:fillRef idx="1">
+              <a:schemeClr val="accent1"/>
+            </a:fillRef>
+            <a:effectRef idx="0">
+              <a:schemeClr val="accent1"/>
+            </a:effectRef>
+            <a:fontRef idx="minor">
+              <a:schemeClr val="lt1"/>
+            </a:fontRef>
+          </p:style>
+          <p:txBody>
+            <a:bodyPr rtlCol="0" anchor="ctr"/>
+            <a:lstStyle/>
+            <a:p>
+              <a:pPr algn="ctr"/>
+              <a:endParaRPr lang="nl-BE"/>
+            </a:p>
+          </p:txBody>
+        </p:sp>
+        <p:sp>
+          <p:nvSpPr>
+            <p:cNvPr id="10" name="Oval 9"/>
+            <p:cNvSpPr>
+              <a:spLocks noChangeAspect="1"/>
+            </p:cNvSpPr>
+            <p:nvPr/>
+          </p:nvSpPr>
+          <p:spPr>
+            <a:xfrm>
+              <a:off x="4038600" y="4127400"/>
+              <a:ext cx="72000" cy="72000"/>
+            </a:xfrm>
+            <a:prstGeom prst="ellipse">
+              <a:avLst/>
+            </a:prstGeom>
+            <a:solidFill>
+              <a:schemeClr val="tx1"/>
+            </a:solidFill>
+            <a:ln>
+              <a:solidFill>
+                <a:schemeClr val="tx1"/>
+              </a:solidFill>
+            </a:ln>
+          </p:spPr>
+          <p:style>
+            <a:lnRef idx="2">
+              <a:schemeClr val="accent1">
+                <a:shade val="50000"/>
+              </a:schemeClr>
+            </a:lnRef>
+            <a:fillRef idx="1">
+              <a:schemeClr val="accent1"/>
+            </a:fillRef>
+            <a:effectRef idx="0">
+              <a:schemeClr val="accent1"/>
+            </a:effectRef>
+            <a:fontRef idx="minor">
+              <a:schemeClr val="lt1"/>
+            </a:fontRef>
+          </p:style>
+          <p:txBody>
+            <a:bodyPr rtlCol="0" anchor="ctr"/>
+            <a:lstStyle/>
+            <a:p>
+              <a:pPr algn="ctr"/>
+              <a:endParaRPr lang="nl-BE"/>
+            </a:p>
+          </p:txBody>
+        </p:sp>
+        <p:sp>
+          <p:nvSpPr>
+            <p:cNvPr id="11" name="Oval 10"/>
+            <p:cNvSpPr>
+              <a:spLocks noChangeAspect="1"/>
+            </p:cNvSpPr>
+            <p:nvPr/>
+          </p:nvSpPr>
+          <p:spPr>
+            <a:xfrm>
+              <a:off x="4419600" y="3429000"/>
+              <a:ext cx="72000" cy="72000"/>
+            </a:xfrm>
+            <a:prstGeom prst="ellipse">
+              <a:avLst/>
+            </a:prstGeom>
+            <a:solidFill>
+              <a:schemeClr val="tx1"/>
+            </a:solidFill>
+            <a:ln>
+              <a:solidFill>
+                <a:schemeClr val="tx1"/>
+              </a:solidFill>
+            </a:ln>
+          </p:spPr>
+          <p:style>
+            <a:lnRef idx="2">
+              <a:schemeClr val="accent1">
+                <a:shade val="50000"/>
+              </a:schemeClr>
+            </a:lnRef>
+            <a:fillRef idx="1">
+              <a:schemeClr val="accent1"/>
+            </a:fillRef>
+            <a:effectRef idx="0">
+              <a:schemeClr val="accent1"/>
+            </a:effectRef>
+            <a:fontRef idx="minor">
+              <a:schemeClr val="lt1"/>
+            </a:fontRef>
+          </p:style>
+          <p:txBody>
+            <a:bodyPr rtlCol="0" anchor="ctr"/>
+            <a:lstStyle/>
+            <a:p>
+              <a:pPr algn="ctr"/>
+              <a:endParaRPr lang="nl-BE"/>
+            </a:p>
+          </p:txBody>
+        </p:sp>
+      </p:grpSp>
+      <p:sp>
+        <p:nvSpPr>
+          <p:cNvPr id="14" name="Rectangle 13"/>
+          <p:cNvSpPr>
+            <a:spLocks noChangeAspect="1"/>
+          </p:cNvSpPr>
+          <p:nvPr/>
+        </p:nvSpPr>
+        <p:spPr>
+          <a:xfrm>
+            <a:off x="1066800" y="3124200"/>
+            <a:ext cx="2160000" cy="1080000"/>
+          </a:xfrm>
+          <a:prstGeom prst="rect">
+            <a:avLst/>
+          </a:prstGeom>
+          <a:solidFill>
+            <a:srgbClr val="0070C0">
+              <a:alpha val="25000"/>
+            </a:srgbClr>
+          </a:solidFill>
+          <a:ln>
+            <a:solidFill>
+              <a:srgbClr val="0070C0"/>
+            </a:solidFill>
+          </a:ln>
+        </p:spPr>
+        <p:style>
+          <a:lnRef idx="2">
+            <a:schemeClr val="accent1">
+              <a:shade val="50000"/>
+            </a:schemeClr>
+          </a:lnRef>
+          <a:fillRef idx="1">
+            <a:schemeClr val="accent1"/>
+          </a:fillRef>
+          <a:effectRef idx="0">
+            <a:schemeClr val="accent1"/>
+          </a:effectRef>
+          <a:fontRef idx="minor">
+            <a:schemeClr val="lt1"/>
+          </a:fontRef>
+        </p:style>
+        <p:txBody>
+          <a:bodyPr rtlCol="0" anchor="ctr"/>
+          <a:lstStyle/>
+          <a:p>
+            <a:pPr algn="ctr"/>
+            <a:endParaRPr lang="nl-BE"/>
+          </a:p>
+        </p:txBody>
+      </p:sp>
+      <p:sp>
+        <p:nvSpPr>
+          <p:cNvPr id="16" name="Rectangle 15"/>
+          <p:cNvSpPr>
+            <a:spLocks noChangeAspect="1"/>
+          </p:cNvSpPr>
+          <p:nvPr/>
+        </p:nvSpPr>
+        <p:spPr>
+          <a:xfrm>
+            <a:off x="1066800" y="4201391"/>
+            <a:ext cx="2160000" cy="1080000"/>
+          </a:xfrm>
+          <a:prstGeom prst="rect">
+            <a:avLst/>
+          </a:prstGeom>
+          <a:solidFill>
+            <a:srgbClr val="FFFF00">
+              <a:alpha val="25000"/>
+            </a:srgbClr>
+          </a:solidFill>
+          <a:ln>
+            <a:solidFill>
+              <a:srgbClr val="FFFF00"/>
+            </a:solidFill>
+          </a:ln>
+        </p:spPr>
+        <p:style>
+          <a:lnRef idx="2">
+            <a:schemeClr val="accent1">
+              <a:shade val="50000"/>
+            </a:schemeClr>
+          </a:lnRef>
+          <a:fillRef idx="1">
+            <a:schemeClr val="accent1"/>
+          </a:fillRef>
+          <a:effectRef idx="0">
+            <a:schemeClr val="accent1"/>
+          </a:effectRef>
+          <a:fontRef idx="minor">
+            <a:schemeClr val="lt1"/>
+          </a:fontRef>
+        </p:style>
+        <p:txBody>
+          <a:bodyPr rtlCol="0" anchor="ctr"/>
+          <a:lstStyle/>
+          <a:p>
+            <a:pPr algn="ctr"/>
+            <a:endParaRPr lang="nl-BE"/>
+          </a:p>
+        </p:txBody>
+      </p:sp>
+      <p:grpSp>
+        <p:nvGrpSpPr>
+          <p:cNvPr id="31" name="Group 30"/>
+          <p:cNvGrpSpPr/>
+          <p:nvPr/>
+        </p:nvGrpSpPr>
+        <p:grpSpPr>
+          <a:xfrm>
+            <a:off x="3235036" y="3124200"/>
+            <a:ext cx="2160000" cy="2157191"/>
+            <a:chOff x="3221182" y="3124200"/>
+            <a:chExt cx="2160000" cy="2157191"/>
+          </a:xfrm>
+        </p:grpSpPr>
+        <p:sp>
+          <p:nvSpPr>
+            <p:cNvPr id="15" name="Rectangle 14"/>
+            <p:cNvSpPr>
+              <a:spLocks noChangeAspect="1"/>
+            </p:cNvSpPr>
+            <p:nvPr/>
+          </p:nvSpPr>
+          <p:spPr>
+            <a:xfrm>
+              <a:off x="3221182" y="3124200"/>
+              <a:ext cx="2160000" cy="1080000"/>
+            </a:xfrm>
+            <a:prstGeom prst="rect">
+              <a:avLst/>
+            </a:prstGeom>
+            <a:solidFill>
+              <a:srgbClr val="00B050">
+                <a:alpha val="25000"/>
+              </a:srgbClr>
+            </a:solidFill>
+            <a:ln>
+              <a:solidFill>
+                <a:srgbClr val="00B050"/>
+              </a:solidFill>
+            </a:ln>
+          </p:spPr>
+          <p:style>
+            <a:lnRef idx="2">
+              <a:schemeClr val="accent1">
+                <a:shade val="50000"/>
+              </a:schemeClr>
+            </a:lnRef>
+            <a:fillRef idx="1">
+              <a:schemeClr val="accent1"/>
+            </a:fillRef>
+            <a:effectRef idx="0">
+              <a:schemeClr val="accent1"/>
+            </a:effectRef>
+            <a:fontRef idx="minor">
+              <a:schemeClr val="lt1"/>
+            </a:fontRef>
+          </p:style>
+          <p:txBody>
+            <a:bodyPr rtlCol="0" anchor="ctr"/>
+            <a:lstStyle/>
+            <a:p>
+              <a:pPr algn="ctr"/>
+              <a:endParaRPr lang="nl-BE"/>
+            </a:p>
+          </p:txBody>
+        </p:sp>
+        <p:sp>
+          <p:nvSpPr>
+            <p:cNvPr id="17" name="Rectangle 16"/>
+            <p:cNvSpPr>
+              <a:spLocks noChangeAspect="1"/>
+            </p:cNvSpPr>
+            <p:nvPr/>
+          </p:nvSpPr>
+          <p:spPr>
+            <a:xfrm>
+              <a:off x="3221182" y="4201391"/>
+              <a:ext cx="2160000" cy="1080000"/>
+            </a:xfrm>
+            <a:prstGeom prst="rect">
+              <a:avLst/>
+            </a:prstGeom>
+            <a:solidFill>
+              <a:srgbClr val="FF0000">
+                <a:alpha val="25000"/>
+              </a:srgbClr>
+            </a:solidFill>
+            <a:ln>
+              <a:solidFill>
+                <a:srgbClr val="FF0000"/>
+              </a:solidFill>
+            </a:ln>
+          </p:spPr>
+          <p:style>
+            <a:lnRef idx="2">
+              <a:schemeClr val="accent1">
+                <a:shade val="50000"/>
+              </a:schemeClr>
+            </a:lnRef>
+            <a:fillRef idx="1">
+              <a:schemeClr val="accent1"/>
+            </a:fillRef>
+            <a:effectRef idx="0">
+              <a:schemeClr val="accent1"/>
+            </a:effectRef>
+            <a:fontRef idx="minor">
+              <a:schemeClr val="lt1"/>
+            </a:fontRef>
+          </p:style>
+          <p:txBody>
+            <a:bodyPr rtlCol="0" anchor="ctr"/>
+            <a:lstStyle/>
+            <a:p>
+              <a:pPr algn="ctr"/>
+              <a:endParaRPr lang="nl-BE"/>
+            </a:p>
+          </p:txBody>
+        </p:sp>
+      </p:grpSp>
+      <p:grpSp>
+        <p:nvGrpSpPr>
+          <p:cNvPr id="23" name="Group 22"/>
+          <p:cNvGrpSpPr/>
+          <p:nvPr/>
+        </p:nvGrpSpPr>
+        <p:grpSpPr>
+          <a:xfrm>
+            <a:off x="1335600" y="3930491"/>
+            <a:ext cx="914400" cy="914400"/>
+            <a:chOff x="4191000" y="4724400"/>
+            <a:chExt cx="914400" cy="914400"/>
+          </a:xfrm>
+        </p:grpSpPr>
+        <p:sp>
+          <p:nvSpPr>
+            <p:cNvPr id="24" name="Oval 23"/>
+            <p:cNvSpPr/>
+            <p:nvPr/>
+          </p:nvSpPr>
+          <p:spPr>
+            <a:xfrm>
+              <a:off x="4191000" y="4724400"/>
+              <a:ext cx="914400" cy="914400"/>
+            </a:xfrm>
+            <a:prstGeom prst="ellipse">
+              <a:avLst/>
+            </a:prstGeom>
+            <a:solidFill>
+              <a:schemeClr val="accent1">
+                <a:lumMod val="20000"/>
+                <a:lumOff val="80000"/>
+                <a:alpha val="32000"/>
+              </a:schemeClr>
+            </a:solidFill>
+            <a:ln w="3175">
+              <a:solidFill>
+                <a:schemeClr val="tx1"/>
+              </a:solidFill>
+              <a:prstDash val="sysDash"/>
+            </a:ln>
+          </p:spPr>
+          <p:style>
+            <a:lnRef idx="2">
+              <a:schemeClr val="accent1">
+                <a:shade val="50000"/>
+              </a:schemeClr>
+            </a:lnRef>
+            <a:fillRef idx="1">
+              <a:schemeClr val="accent1"/>
+            </a:fillRef>
+            <a:effectRef idx="0">
+              <a:schemeClr val="accent1"/>
+            </a:effectRef>
+            <a:fontRef idx="minor">
+              <a:schemeClr val="lt1"/>
+            </a:fontRef>
+          </p:style>
+          <p:txBody>
+            <a:bodyPr rtlCol="0" anchor="ctr"/>
+            <a:lstStyle/>
+            <a:p>
+              <a:pPr algn="ctr"/>
+              <a:endParaRPr lang="nl-BE"/>
+            </a:p>
+          </p:txBody>
+        </p:sp>
+        <p:sp>
+          <p:nvSpPr>
+            <p:cNvPr id="25" name="Oval 24"/>
+            <p:cNvSpPr>
+              <a:spLocks noChangeAspect="1"/>
+            </p:cNvSpPr>
+            <p:nvPr/>
+          </p:nvSpPr>
+          <p:spPr>
+            <a:xfrm>
+              <a:off x="4612200" y="5145600"/>
+              <a:ext cx="72000" cy="72000"/>
+            </a:xfrm>
+            <a:prstGeom prst="ellipse">
+              <a:avLst/>
+            </a:prstGeom>
+            <a:solidFill>
+              <a:srgbClr val="C00000"/>
+            </a:solidFill>
+            <a:ln>
+              <a:solidFill>
+                <a:srgbClr val="C00000"/>
+              </a:solidFill>
+            </a:ln>
+          </p:spPr>
+          <p:style>
+            <a:lnRef idx="2">
+              <a:schemeClr val="accent1">
+                <a:shade val="50000"/>
+              </a:schemeClr>
+            </a:lnRef>
+            <a:fillRef idx="1">
+              <a:schemeClr val="accent1"/>
+            </a:fillRef>
+            <a:effectRef idx="0">
+              <a:schemeClr val="accent1"/>
+            </a:effectRef>
+            <a:fontRef idx="minor">
+              <a:schemeClr val="lt1"/>
+            </a:fontRef>
+          </p:style>
+          <p:txBody>
+            <a:bodyPr rtlCol="0" anchor="ctr"/>
+            <a:lstStyle/>
+            <a:p>
+              <a:pPr algn="ctr"/>
+              <a:endParaRPr lang="nl-BE"/>
+            </a:p>
+          </p:txBody>
+        </p:sp>
+      </p:grpSp>
+      <p:grpSp>
+        <p:nvGrpSpPr>
+          <p:cNvPr id="30" name="Group 29"/>
+          <p:cNvGrpSpPr/>
+          <p:nvPr/>
+        </p:nvGrpSpPr>
+        <p:grpSpPr>
+          <a:xfrm>
+            <a:off x="3348600" y="2590800"/>
+            <a:ext cx="2032582" cy="3352800"/>
+            <a:chOff x="3348600" y="2590800"/>
+            <a:chExt cx="2032582" cy="3352800"/>
+          </a:xfrm>
+        </p:grpSpPr>
+        <p:cxnSp>
+          <p:nvCxnSpPr>
+            <p:cNvPr id="27" name="Straight Connector 26"/>
+            <p:cNvCxnSpPr/>
+            <p:nvPr/>
+          </p:nvCxnSpPr>
+          <p:spPr>
+            <a:xfrm flipV="1">
+              <a:off x="3348600" y="2590800"/>
+              <a:ext cx="1833000" cy="3352800"/>
+            </a:xfrm>
+            <a:prstGeom prst="line">
+              <a:avLst/>
+            </a:prstGeom>
+            <a:ln w="57150">
+              <a:solidFill>
+                <a:srgbClr val="C00000"/>
+              </a:solidFill>
+            </a:ln>
+          </p:spPr>
+          <p:style>
+            <a:lnRef idx="1">
+              <a:schemeClr val="accent1"/>
+            </a:lnRef>
+            <a:fillRef idx="0">
+              <a:schemeClr val="accent1"/>
+            </a:fillRef>
+            <a:effectRef idx="0">
+              <a:schemeClr val="accent1"/>
+            </a:effectRef>
+            <a:fontRef idx="minor">
+              <a:schemeClr val="tx1"/>
+            </a:fontRef>
+          </p:style>
+        </p:cxnSp>
+        <p:cxnSp>
+          <p:nvCxnSpPr>
+            <p:cNvPr id="28" name="Straight Connector 27"/>
+            <p:cNvCxnSpPr/>
+            <p:nvPr/>
+          </p:nvCxnSpPr>
+          <p:spPr>
+            <a:xfrm>
+              <a:off x="3653400" y="2711291"/>
+              <a:ext cx="1727782" cy="3079909"/>
+            </a:xfrm>
+            <a:prstGeom prst="line">
+              <a:avLst/>
+            </a:prstGeom>
+            <a:ln w="57150">
+              <a:solidFill>
+                <a:srgbClr val="C00000"/>
+              </a:solidFill>
+            </a:ln>
+          </p:spPr>
+          <p:style>
+            <a:lnRef idx="1">
+              <a:schemeClr val="accent1"/>
+            </a:lnRef>
+            <a:fillRef idx="0">
+              <a:schemeClr val="accent1"/>
+            </a:fillRef>
+            <a:effectRef idx="0">
+              <a:schemeClr val="accent1"/>
+            </a:effectRef>
+            <a:fontRef idx="minor">
+              <a:schemeClr val="tx1"/>
+            </a:fontRef>
+          </p:style>
+        </p:cxnSp>
+      </p:grpSp>
+      <p:sp>
+        <p:nvSpPr>
+          <p:cNvPr id="33" name="TextBox 32"/>
+          <p:cNvSpPr txBox="1"/>
+          <p:nvPr/>
+        </p:nvSpPr>
+        <p:spPr>
+          <a:xfrm>
+            <a:off x="5867400" y="3617893"/>
+            <a:ext cx="2971800" cy="954107"/>
+          </a:xfrm>
+          <a:prstGeom prst="rect">
+            <a:avLst/>
+          </a:prstGeom>
+          <a:solidFill>
+            <a:srgbClr val="FF0000">
+              <a:alpha val="24000"/>
+            </a:srgbClr>
+          </a:solidFill>
+          <a:ln>
+            <a:solidFill>
+              <a:srgbClr val="FF0000"/>
+            </a:solidFill>
+          </a:ln>
+        </p:spPr>
+        <p:txBody>
+          <a:bodyPr wrap="square" rtlCol="0">
+            <a:spAutoFit/>
+          </a:bodyPr>
+          <a:lstStyle/>
+          <a:p>
+            <a:r>
+              <a:rPr lang="en-US" sz="2800" dirty="0" smtClean="0"/>
+              <a:t>Only few distances to calculate: fast!</a:t>
+            </a:r>
+            <a:endParaRPr lang="nl-BE" sz="2800" dirty="0"/>
+          </a:p>
+        </p:txBody>
+      </p:sp>
+    </p:spTree>
+    <p:extLst>
+      <p:ext uri="{BB962C8B-B14F-4D97-AF65-F5344CB8AC3E}">
+        <p14:creationId xmlns:p14="http://schemas.microsoft.com/office/powerpoint/2010/main" val="1374967025"/>
+      </p:ext>
+    </p:extLst>
+  </p:cSld>
+  <p:clrMapOvr>
+    <a:masterClrMapping/>
+  </p:clrMapOvr>
+  <p:timing>
+    <p:tnLst>
+      <p:par>
+        <p:cTn id="1" dur="indefinite" restart="never" nodeType="tmRoot">
+          <p:childTnLst>
+            <p:seq concurrent="1" nextAc="seek">
+              <p:cTn id="2" dur="indefinite" nodeType="mainSeq">
+                <p:childTnLst>
+                  <p:par>
+                    <p:cTn id="3" fill="hold">
+                      <p:stCondLst>
+                        <p:cond delay="indefinite"/>
+                      </p:stCondLst>
+                      <p:childTnLst>
+                        <p:par>
+                          <p:cTn id="4" fill="hold">
+                            <p:stCondLst>
+                              <p:cond delay="0"/>
+                            </p:stCondLst>
+                            <p:childTnLst>
+                              <p:par>
+                                <p:cTn id="5" presetID="1" presetClass="entr" presetSubtype="0" fill="hold" nodeType="clickEffect">
+                                  <p:stCondLst>
+                                    <p:cond delay="0"/>
+                                  </p:stCondLst>
+                                  <p:childTnLst>
+                                    <p:set>
+                                      <p:cBhvr>
+                                        <p:cTn id="6" dur="1" fill="hold">
+                                          <p:stCondLst>
+                                            <p:cond delay="0"/>
+                                          </p:stCondLst>
+                                        </p:cTn>
+                                        <p:tgtEl>
+                                          <p:spTgt spid="23"/>
+                                        </p:tgtEl>
+                                        <p:attrNameLst>
+                                          <p:attrName>style.visibility</p:attrName>
+                                        </p:attrNameLst>
+                                      </p:cBhvr>
+                                      <p:to>
+                                        <p:strVal val="visible"/>
+                                      </p:to>
+                                    </p:set>
+                                  </p:childTnLst>
+                                </p:cTn>
+                              </p:par>
+                            </p:childTnLst>
+                          </p:cTn>
+                        </p:par>
+                      </p:childTnLst>
+                    </p:cTn>
+                  </p:par>
+                  <p:par>
+                    <p:cTn id="7" fill="hold">
+                      <p:stCondLst>
+                        <p:cond delay="indefinite"/>
+                      </p:stCondLst>
+                      <p:childTnLst>
+                        <p:par>
+                          <p:cTn id="8" fill="hold">
+                            <p:stCondLst>
+                              <p:cond delay="0"/>
+                            </p:stCondLst>
+                            <p:childTnLst>
+                              <p:par>
+                                <p:cTn id="9" presetID="1" presetClass="entr" presetSubtype="0" fill="hold" nodeType="clickEffect">
+                                  <p:stCondLst>
+                                    <p:cond delay="0"/>
+                                  </p:stCondLst>
+                                  <p:childTnLst>
+                                    <p:set>
+                                      <p:cBhvr>
+                                        <p:cTn id="10" dur="1" fill="hold">
+                                          <p:stCondLst>
+                                            <p:cond delay="0"/>
+                                          </p:stCondLst>
+                                        </p:cTn>
+                                        <p:tgtEl>
+                                          <p:spTgt spid="30"/>
+                                        </p:tgtEl>
+                                        <p:attrNameLst>
+                                          <p:attrName>style.visibility</p:attrName>
+                                        </p:attrNameLst>
+                                      </p:cBhvr>
+                                      <p:to>
+                                        <p:strVal val="visible"/>
+                                      </p:to>
+                                    </p:set>
+                                  </p:childTnLst>
+                                </p:cTn>
+                              </p:par>
+                              <p:par>
+                                <p:cTn id="11" presetID="10" presetClass="exit" presetSubtype="0" fill="hold" nodeType="withEffect">
+                                  <p:stCondLst>
+                                    <p:cond delay="0"/>
+                                  </p:stCondLst>
+                                  <p:childTnLst>
+                                    <p:animEffect transition="out" filter="fade">
+                                      <p:cBhvr>
+                                        <p:cTn id="12" dur="500"/>
+                                        <p:tgtEl>
+                                          <p:spTgt spid="32"/>
+                                        </p:tgtEl>
+                                      </p:cBhvr>
+                                    </p:animEffect>
+                                    <p:set>
+                                      <p:cBhvr>
+                                        <p:cTn id="13" dur="1" fill="hold">
+                                          <p:stCondLst>
+                                            <p:cond delay="499"/>
+                                          </p:stCondLst>
+                                        </p:cTn>
+                                        <p:tgtEl>
+                                          <p:spTgt spid="32"/>
+                                        </p:tgtEl>
+                                        <p:attrNameLst>
+                                          <p:attrName>style.visibility</p:attrName>
+                                        </p:attrNameLst>
+                                      </p:cBhvr>
+                                      <p:to>
+                                        <p:strVal val="hidden"/>
+                                      </p:to>
+                                    </p:set>
+                                  </p:childTnLst>
+                                </p:cTn>
+                              </p:par>
+                              <p:par>
+                                <p:cTn id="14" presetID="10" presetClass="exit" presetSubtype="0" fill="hold" nodeType="withEffect">
+                                  <p:stCondLst>
+                                    <p:cond delay="0"/>
+                                  </p:stCondLst>
+                                  <p:childTnLst>
+                                    <p:animEffect transition="out" filter="fade">
+                                      <p:cBhvr>
+                                        <p:cTn id="15" dur="500"/>
+                                        <p:tgtEl>
+                                          <p:spTgt spid="30"/>
+                                        </p:tgtEl>
+                                      </p:cBhvr>
+                                    </p:animEffect>
+                                    <p:set>
+                                      <p:cBhvr>
+                                        <p:cTn id="16" dur="1" fill="hold">
+                                          <p:stCondLst>
+                                            <p:cond delay="499"/>
+                                          </p:stCondLst>
+                                        </p:cTn>
+                                        <p:tgtEl>
+                                          <p:spTgt spid="30"/>
+                                        </p:tgtEl>
+                                        <p:attrNameLst>
+                                          <p:attrName>style.visibility</p:attrName>
+                                        </p:attrNameLst>
+                                      </p:cBhvr>
+                                      <p:to>
+                                        <p:strVal val="hidden"/>
+                                      </p:to>
+                                    </p:set>
+                                  </p:childTnLst>
+                                </p:cTn>
+                              </p:par>
+                              <p:par>
+                                <p:cTn id="17" presetID="10" presetClass="exit" presetSubtype="0" fill="hold" nodeType="withEffect">
+                                  <p:stCondLst>
+                                    <p:cond delay="0"/>
+                                  </p:stCondLst>
+                                  <p:childTnLst>
+                                    <p:animEffect transition="out" filter="fade">
+                                      <p:cBhvr>
+                                        <p:cTn id="18" dur="500"/>
+                                        <p:tgtEl>
+                                          <p:spTgt spid="31"/>
+                                        </p:tgtEl>
+                                      </p:cBhvr>
+                                    </p:animEffect>
+                                    <p:set>
+                                      <p:cBhvr>
+                                        <p:cTn id="19" dur="1" fill="hold">
+                                          <p:stCondLst>
+                                            <p:cond delay="499"/>
+                                          </p:stCondLst>
+                                        </p:cTn>
+                                        <p:tgtEl>
+                                          <p:spTgt spid="31"/>
+                                        </p:tgtEl>
+                                        <p:attrNameLst>
+                                          <p:attrName>style.visibility</p:attrName>
+                                        </p:attrNameLst>
+                                      </p:cBhvr>
+                                      <p:to>
+                                        <p:strVal val="hidden"/>
+                                      </p:to>
+                                    </p:set>
+                                  </p:childTnLst>
+                                </p:cTn>
+                              </p:par>
+                            </p:childTnLst>
+                          </p:cTn>
+                        </p:par>
+                      </p:childTnLst>
+                    </p:cTn>
+                  </p:par>
+                  <p:par>
+                    <p:cTn id="20" fill="hold">
+                      <p:stCondLst>
+                        <p:cond delay="indefinite"/>
+                      </p:stCondLst>
+                      <p:childTnLst>
+                        <p:par>
+                          <p:cTn id="21" fill="hold">
+                            <p:stCondLst>
+                              <p:cond delay="0"/>
+                            </p:stCondLst>
+                            <p:childTnLst>
+                              <p:par>
+                                <p:cTn id="22" presetID="1" presetClass="entr" presetSubtype="0" fill="hold" grpId="0" nodeType="clickEffect">
+                                  <p:stCondLst>
+                                    <p:cond delay="0"/>
+                                  </p:stCondLst>
+                                  <p:childTnLst>
+                                    <p:set>
+                                      <p:cBhvr>
+                                        <p:cTn id="23" dur="1" fill="hold">
+                                          <p:stCondLst>
+                                            <p:cond delay="0"/>
+                                          </p:stCondLst>
+                                        </p:cTn>
+                                        <p:tgtEl>
+                                          <p:spTgt spid="33"/>
+                                        </p:tgtEl>
+                                        <p:attrNameLst>
+                                          <p:attrName>style.visibility</p:attrName>
+                                        </p:attrNameLst>
+                                      </p:cBhvr>
+                                      <p:to>
+                                        <p:strVal val="visible"/>
+                                      </p:to>
+                                    </p:set>
+                                  </p:childTnLst>
+                                </p:cTn>
+                              </p:par>
+                            </p:childTnLst>
+                          </p:cTn>
+                        </p:par>
+                      </p:childTnLst>
+                    </p:cTn>
+                  </p:par>
+                </p:childTnLst>
+              </p:cTn>
+              <p:prevCondLst>
+                <p:cond evt="onPrev" delay="0">
+                  <p:tgtEl>
+                    <p:sldTgt/>
+                  </p:tgtEl>
+                </p:cond>
+              </p:prevCondLst>
+              <p:nextCondLst>
+                <p:cond evt="onNext" delay="0">
+                  <p:tgtEl>
+                    <p:sldTgt/>
+                  </p:tgtEl>
+                </p:cond>
+              </p:nextCondLst>
+            </p:seq>
+          </p:childTnLst>
+        </p:cTn>
+      </p:par>
+    </p:tnLst>
+    <p:bldLst>
+      <p:bldP spid="33" grpId="0" animBg="1"/>
+    </p:bldLst>
+  </p:timing>
+</p:sld>
+</file>
+
+<file path=ppt/slides/slide7.xml><?xml version="1.0" encoding="utf-8"?>
+<p:sld xmlns:a="http://schemas.openxmlformats.org/drawingml/2006/main" xmlns:r="http://schemas.openxmlformats.org/officeDocument/2006/relationships" xmlns:p="http://schemas.openxmlformats.org/presentationml/2006/main">
+  <p:cSld>
+    <p:spTree>
+      <p:nvGrpSpPr>
+        <p:cNvPr id="1" name=""/>
+        <p:cNvGrpSpPr/>
+        <p:nvPr/>
+      </p:nvGrpSpPr>
+      <p:grpSpPr>
+        <a:xfrm>
+          <a:off x="0" y="0"/>
+          <a:ext cx="0" cy="0"/>
+          <a:chOff x="0" y="0"/>
+          <a:chExt cx="0" cy="0"/>
+        </a:xfrm>
+      </p:grpSpPr>
+      <p:sp>
+        <p:nvSpPr>
+          <p:cNvPr id="2" name="Title 1"/>
+          <p:cNvSpPr>
+            <a:spLocks noGrp="1"/>
+          </p:cNvSpPr>
+          <p:nvPr>
+            <p:ph type="title"/>
+          </p:nvPr>
+        </p:nvSpPr>
+        <p:spPr/>
+        <p:txBody>
+          <a:bodyPr/>
+          <a:lstStyle/>
+          <a:p>
+            <a:r>
+              <a:rPr lang="en-US" dirty="0" smtClean="0"/>
+              <a:t>Query algorithm</a:t>
+            </a:r>
+            <a:endParaRPr lang="nl-BE" dirty="0"/>
+          </a:p>
+        </p:txBody>
+      </p:sp>
+      <p:sp>
+        <p:nvSpPr>
+          <p:cNvPr id="3" name="Content Placeholder 2"/>
+          <p:cNvSpPr>
+            <a:spLocks noGrp="1"/>
+          </p:cNvSpPr>
+          <p:nvPr>
+            <p:ph idx="1"/>
+          </p:nvPr>
+        </p:nvSpPr>
+        <p:spPr/>
+        <p:txBody>
+          <a:bodyPr>
+            <a:normAutofit fontScale="92500" lnSpcReduction="20000"/>
+          </a:bodyPr>
+          <a:lstStyle/>
+          <a:p>
+            <a:r>
+              <a:rPr lang="en-US" dirty="0"/>
+              <a:t>i</a:t>
+            </a:r>
+            <a:r>
+              <a:rPr lang="en-US" dirty="0" smtClean="0"/>
+              <a:t>nitialize empty region list</a:t>
+            </a:r>
+          </a:p>
+          <a:p>
+            <a:r>
+              <a:rPr lang="en-US" dirty="0" smtClean="0"/>
+              <a:t>start at top region</a:t>
+            </a:r>
+          </a:p>
+          <a:p>
+            <a:r>
+              <a:rPr lang="en-US" dirty="0" smtClean="0"/>
+              <a:t>in region</a:t>
+            </a:r>
+          </a:p>
+          <a:p>
+            <a:pPr lvl="1"/>
+            <a:r>
+              <a:rPr lang="en-US" dirty="0" smtClean="0"/>
+              <a:t>if query </a:t>
+            </a:r>
+            <a:r>
+              <a:rPr lang="en-US" dirty="0" err="1" smtClean="0"/>
+              <a:t>can not</a:t>
+            </a:r>
+            <a:r>
+              <a:rPr lang="en-US" dirty="0" smtClean="0"/>
+              <a:t> return points in region, stop</a:t>
+            </a:r>
+          </a:p>
+          <a:p>
+            <a:pPr lvl="1"/>
+            <a:r>
+              <a:rPr lang="en-US" dirty="0" smtClean="0"/>
+              <a:t>else if region is leaf, add node to region list</a:t>
+            </a:r>
+          </a:p>
+          <a:p>
+            <a:pPr lvl="1"/>
+            <a:r>
+              <a:rPr lang="en-US" dirty="0"/>
+              <a:t>e</a:t>
+            </a:r>
+            <a:r>
+              <a:rPr lang="en-US" dirty="0" smtClean="0"/>
+              <a:t>lse query each </a:t>
+            </a:r>
+            <a:r>
+              <a:rPr lang="en-US" dirty="0" err="1" smtClean="0"/>
+              <a:t>subregion</a:t>
+            </a:r>
+            <a:endParaRPr lang="en-US" dirty="0" smtClean="0"/>
+          </a:p>
+          <a:p>
+            <a:r>
+              <a:rPr lang="en-US" dirty="0"/>
+              <a:t>i</a:t>
+            </a:r>
+            <a:r>
+              <a:rPr lang="en-US" dirty="0" smtClean="0"/>
+              <a:t>nitialize empty point list</a:t>
+            </a:r>
+          </a:p>
+          <a:p>
+            <a:r>
+              <a:rPr lang="en-US" dirty="0" smtClean="0"/>
+              <a:t>for each region in region list</a:t>
+            </a:r>
+          </a:p>
+          <a:p>
+            <a:pPr lvl="1"/>
+            <a:r>
+              <a:rPr lang="en-US" dirty="0"/>
+              <a:t>c</a:t>
+            </a:r>
+            <a:r>
+              <a:rPr lang="en-US" dirty="0" smtClean="0"/>
+              <a:t>ompute distance to query point for each point, if less than radius, add point to point list</a:t>
+            </a:r>
+            <a:endParaRPr lang="nl-BE" dirty="0"/>
+          </a:p>
+        </p:txBody>
+      </p:sp>
+    </p:spTree>
+    <p:extLst>
+      <p:ext uri="{BB962C8B-B14F-4D97-AF65-F5344CB8AC3E}">
+        <p14:creationId xmlns:p14="http://schemas.microsoft.com/office/powerpoint/2010/main" val="4036830306"/>
+      </p:ext>
+    </p:extLst>
+  </p:cSld>
+  <p:clrMapOvr>
+    <a:masterClrMapping/>
+  </p:clrMapOvr>
+  <p:timing>
+    <p:tnLst>
+      <p:par>
+        <p:cTn id="1" dur="indefinite" restart="never" nodeType="tmRoot"/>
+      </p:par>
+    </p:tnLst>
+  </p:timing>
+</p:sld>
+</file>
+
+<file path=ppt/slides/slide8.xml><?xml version="1.0" encoding="utf-8"?>
+<p:sld xmlns:a="http://schemas.openxmlformats.org/drawingml/2006/main" xmlns:r="http://schemas.openxmlformats.org/officeDocument/2006/relationships" xmlns:p="http://schemas.openxmlformats.org/presentationml/2006/main">
+  <p:cSld>
+    <p:spTree>
+      <p:nvGrpSpPr>
+        <p:cNvPr id="1" name=""/>
+        <p:cNvGrpSpPr/>
+        <p:nvPr/>
+      </p:nvGrpSpPr>
+      <p:grpSpPr>
+        <a:xfrm>
+          <a:off x="0" y="0"/>
+          <a:ext cx="0" cy="0"/>
+          <a:chOff x="0" y="0"/>
+          <a:chExt cx="0" cy="0"/>
+        </a:xfrm>
+      </p:grpSpPr>
+      <p:sp>
+        <p:nvSpPr>
+          <p:cNvPr id="2" name="Title 1"/>
+          <p:cNvSpPr>
+            <a:spLocks noGrp="1"/>
+          </p:cNvSpPr>
+          <p:nvPr>
+            <p:ph type="title"/>
+          </p:nvPr>
+        </p:nvSpPr>
+        <p:spPr/>
+        <p:txBody>
+          <a:bodyPr/>
+          <a:lstStyle/>
+          <a:p>
+            <a:r>
+              <a:rPr lang="en-US" dirty="0" smtClean="0"/>
+              <a:t>How much faster?</a:t>
+            </a:r>
+            <a:endParaRPr lang="nl-BE" dirty="0"/>
+          </a:p>
+        </p:txBody>
+      </p:sp>
+      <p:sp>
+        <p:nvSpPr>
+          <p:cNvPr id="3" name="Content Placeholder 2"/>
+          <p:cNvSpPr>
+            <a:spLocks noGrp="1"/>
+          </p:cNvSpPr>
+          <p:nvPr>
+            <p:ph idx="1"/>
+          </p:nvPr>
+        </p:nvSpPr>
+        <p:spPr>
+          <a:xfrm>
+            <a:off x="457200" y="1600200"/>
+            <a:ext cx="2895600" cy="4525963"/>
+          </a:xfrm>
+        </p:spPr>
+        <p:txBody>
+          <a:bodyPr/>
+          <a:lstStyle/>
+          <a:p>
+            <a:r>
+              <a:rPr lang="en-US" dirty="0" smtClean="0"/>
+              <a:t>Depends on</a:t>
+            </a:r>
+          </a:p>
+          <a:p>
+            <a:pPr lvl="1"/>
+            <a:r>
+              <a:rPr lang="en-US" dirty="0" smtClean="0"/>
+              <a:t>number of</a:t>
+            </a:r>
+            <a:br>
+              <a:rPr lang="en-US" dirty="0" smtClean="0"/>
+            </a:br>
+            <a:r>
+              <a:rPr lang="en-US" dirty="0" smtClean="0"/>
+              <a:t>points</a:t>
+            </a:r>
+          </a:p>
+          <a:p>
+            <a:pPr lvl="1"/>
+            <a:r>
+              <a:rPr lang="en-US" dirty="0" smtClean="0"/>
+              <a:t>number of</a:t>
+            </a:r>
+            <a:br>
+              <a:rPr lang="en-US" dirty="0" smtClean="0"/>
+            </a:br>
+            <a:r>
+              <a:rPr lang="en-US" dirty="0" smtClean="0"/>
+              <a:t>results</a:t>
+            </a:r>
+            <a:endParaRPr lang="nl-BE" dirty="0"/>
+          </a:p>
+        </p:txBody>
+      </p:sp>
+      <p:pic>
+        <p:nvPicPr>
+          <p:cNvPr id="6" name="Picture 5"/>
+          <p:cNvPicPr>
+            <a:picLocks noChangeAspect="1"/>
+          </p:cNvPicPr>
+          <p:nvPr/>
+        </p:nvPicPr>
+        <p:blipFill>
+          <a:blip r:embed="rId2">
+            <a:extLst>
+              <a:ext uri="{28A0092B-C50C-407E-A947-70E740481C1C}">
+                <a14:useLocalDpi xmlns:a14="http://schemas.microsoft.com/office/drawing/2010/main" val="0"/>
+              </a:ext>
+            </a:extLst>
+          </a:blip>
+          <a:stretch>
+            <a:fillRect/>
+          </a:stretch>
+        </p:blipFill>
+        <p:spPr>
+          <a:xfrm>
+            <a:off x="2989118" y="1752600"/>
+            <a:ext cx="6172200" cy="4464996"/>
+          </a:xfrm>
+          <a:prstGeom prst="rect">
+            <a:avLst/>
+          </a:prstGeom>
+        </p:spPr>
+      </p:pic>
+      <p:sp>
+        <p:nvSpPr>
+          <p:cNvPr id="7" name="TextBox 6"/>
+          <p:cNvSpPr txBox="1"/>
+          <p:nvPr/>
+        </p:nvSpPr>
+        <p:spPr>
+          <a:xfrm>
+            <a:off x="176239" y="4876800"/>
+            <a:ext cx="3024161" cy="461665"/>
+          </a:xfrm>
+          <a:prstGeom prst="rect">
+            <a:avLst/>
+          </a:prstGeom>
+          <a:solidFill>
+            <a:srgbClr val="FF0000">
+              <a:alpha val="24000"/>
+            </a:srgbClr>
+          </a:solidFill>
+          <a:ln>
+            <a:solidFill>
+              <a:srgbClr val="FF0000"/>
+            </a:solidFill>
+          </a:ln>
+        </p:spPr>
+        <p:txBody>
+          <a:bodyPr wrap="none" rtlCol="0">
+            <a:spAutoFit/>
+          </a:bodyPr>
+          <a:lstStyle/>
+          <a:p>
+            <a:r>
+              <a:rPr lang="en-US" sz="2400" dirty="0" smtClean="0"/>
+              <a:t>Can be a factor of 100!</a:t>
+            </a:r>
+            <a:endParaRPr lang="nl-BE" sz="2400" dirty="0"/>
+          </a:p>
+        </p:txBody>
+      </p:sp>
+      <p:cxnSp>
+        <p:nvCxnSpPr>
+          <p:cNvPr id="9" name="Straight Connector 8"/>
+          <p:cNvCxnSpPr/>
+          <p:nvPr/>
+        </p:nvCxnSpPr>
+        <p:spPr>
+          <a:xfrm>
+            <a:off x="3352800" y="4572000"/>
+            <a:ext cx="5715000" cy="0"/>
+          </a:xfrm>
+          <a:prstGeom prst="line">
+            <a:avLst/>
+          </a:prstGeom>
+          <a:ln w="12700">
+            <a:solidFill>
+              <a:schemeClr val="tx1"/>
+            </a:solidFill>
+            <a:prstDash val="dash"/>
+          </a:ln>
+        </p:spPr>
+        <p:style>
+          <a:lnRef idx="1">
+            <a:schemeClr val="accent1"/>
+          </a:lnRef>
+          <a:fillRef idx="0">
+            <a:schemeClr val="accent1"/>
+          </a:fillRef>
+          <a:effectRef idx="0">
+            <a:schemeClr val="accent1"/>
+          </a:effectRef>
+          <a:fontRef idx="minor">
+            <a:schemeClr val="tx1"/>
+          </a:fontRef>
+        </p:style>
+      </p:cxnSp>
+      <p:cxnSp>
+        <p:nvCxnSpPr>
+          <p:cNvPr id="11" name="Straight Connector 10"/>
+          <p:cNvCxnSpPr/>
+          <p:nvPr/>
+        </p:nvCxnSpPr>
+        <p:spPr>
+          <a:xfrm>
+            <a:off x="7239000" y="4572000"/>
+            <a:ext cx="0" cy="1371600"/>
+          </a:xfrm>
+          <a:prstGeom prst="line">
+            <a:avLst/>
+          </a:prstGeom>
+          <a:ln w="12700">
+            <a:solidFill>
+              <a:schemeClr val="tx1"/>
+            </a:solidFill>
+            <a:prstDash val="dash"/>
+          </a:ln>
+        </p:spPr>
+        <p:style>
+          <a:lnRef idx="1">
+            <a:schemeClr val="accent1"/>
+          </a:lnRef>
+          <a:fillRef idx="0">
+            <a:schemeClr val="accent1"/>
+          </a:fillRef>
+          <a:effectRef idx="0">
+            <a:schemeClr val="accent1"/>
+          </a:effectRef>
+          <a:fontRef idx="minor">
+            <a:schemeClr val="tx1"/>
+          </a:fontRef>
+        </p:style>
+      </p:cxnSp>
+    </p:spTree>
+    <p:extLst>
+      <p:ext uri="{BB962C8B-B14F-4D97-AF65-F5344CB8AC3E}">
+        <p14:creationId xmlns:p14="http://schemas.microsoft.com/office/powerpoint/2010/main" val="725408400"/>
+      </p:ext>
+    </p:extLst>
+  </p:cSld>
+  <p:clrMapOvr>
+    <a:masterClrMapping/>
+  </p:clrMapOvr>
+  <p:timing>
+    <p:tnLst>
+      <p:par>
+        <p:cTn id="1" dur="indefinite" restart="never" nodeType="tmRoot">
+          <p:childTnLst>
+            <p:seq concurrent="1" nextAc="seek">
+              <p:cTn id="2" dur="indefinite" nodeType="mainSeq">
+                <p:childTnLst>
+                  <p:par>
+                    <p:cTn id="3" fill="hold">
+                      <p:stCondLst>
+                        <p:cond delay="indefinite"/>
+                        <p:cond evt="onBegin" delay="0">
+                          <p:tn val="2"/>
+                        </p:cond>
+                      </p:stCondLst>
+                      <p:childTnLst>
+                        <p:par>
+                          <p:cTn id="4" fill="hold">
+                            <p:stCondLst>
+                              <p:cond delay="0"/>
+                            </p:stCondLst>
+                            <p:childTnLst>
+                              <p:par>
+                                <p:cTn id="5" presetID="1" presetClass="entr" presetSubtype="0" fill="hold" grpId="0" nodeType="withEffect">
+                                  <p:stCondLst>
+                                    <p:cond delay="0"/>
+                                  </p:stCondLst>
+                                  <p:childTnLst>
+                                    <p:set>
+                                      <p:cBhvr>
+                                        <p:cTn id="6" dur="1" fill="hold">
+                                          <p:stCondLst>
+                                            <p:cond delay="0"/>
+                                          </p:stCondLst>
+                                        </p:cTn>
+                                        <p:tgtEl>
+                                          <p:spTgt spid="3">
+                                            <p:txEl>
+                                              <p:pRg st="0" end="0"/>
+                                            </p:txEl>
+                                          </p:spTgt>
+                                        </p:tgtEl>
+                                        <p:attrNameLst>
+                                          <p:attrName>style.visibility</p:attrName>
+                                        </p:attrNameLst>
+                                      </p:cBhvr>
+                                      <p:to>
+                                        <p:strVal val="visible"/>
+                                      </p:to>
+                                    </p:set>
+                                  </p:childTnLst>
+                                </p:cTn>
+                              </p:par>
+                            </p:childTnLst>
+                          </p:cTn>
+                        </p:par>
+                      </p:childTnLst>
+                    </p:cTn>
+                  </p:par>
+                  <p:par>
+                    <p:cTn id="7" fill="hold">
+                      <p:stCondLst>
+                        <p:cond delay="indefinite"/>
+                      </p:stCondLst>
+                      <p:childTnLst>
+                        <p:par>
+                          <p:cTn id="8" fill="hold">
+                            <p:stCondLst>
+                              <p:cond delay="0"/>
+                            </p:stCondLst>
+                            <p:childTnLst>
+                              <p:par>
+                                <p:cTn id="9" presetID="1" presetClass="entr" presetSubtype="0" fill="hold" grpId="0" nodeType="clickEffect">
+                                  <p:stCondLst>
+                                    <p:cond delay="0"/>
+                                  </p:stCondLst>
+                                  <p:childTnLst>
+                                    <p:set>
+                                      <p:cBhvr>
+                                        <p:cTn id="10" dur="1" fill="hold">
+                                          <p:stCondLst>
+                                            <p:cond delay="0"/>
+                                          </p:stCondLst>
+                                        </p:cTn>
+                                        <p:tgtEl>
+                                          <p:spTgt spid="3">
+                                            <p:txEl>
+                                              <p:pRg st="1" end="1"/>
+                                            </p:txEl>
+                                          </p:spTgt>
+                                        </p:tgtEl>
+                                        <p:attrNameLst>
+                                          <p:attrName>style.visibility</p:attrName>
+                                        </p:attrNameLst>
+                                      </p:cBhvr>
+                                      <p:to>
+                                        <p:strVal val="visible"/>
+                                      </p:to>
+                                    </p:set>
+                                  </p:childTnLst>
+                                </p:cTn>
+                              </p:par>
+                            </p:childTnLst>
+                          </p:cTn>
+                        </p:par>
+                      </p:childTnLst>
+                    </p:cTn>
+                  </p:par>
+                  <p:par>
+                    <p:cTn id="11" fill="hold">
+                      <p:stCondLst>
+                        <p:cond delay="indefinite"/>
+                      </p:stCondLst>
+                      <p:childTnLst>
+                        <p:par>
+                          <p:cTn id="12" fill="hold">
+                            <p:stCondLst>
+                              <p:cond delay="0"/>
+                            </p:stCondLst>
+                            <p:childTnLst>
+                              <p:par>
+                                <p:cTn id="13" presetID="1" presetClass="entr" presetSubtype="0" fill="hold" grpId="0" nodeType="clickEffect">
+                                  <p:stCondLst>
+                                    <p:cond delay="0"/>
+                                  </p:stCondLst>
+                                  <p:childTnLst>
+                                    <p:set>
+                                      <p:cBhvr>
+                                        <p:cTn id="14" dur="1" fill="hold">
+                                          <p:stCondLst>
+                                            <p:cond delay="0"/>
+                                          </p:stCondLst>
+                                        </p:cTn>
+                                        <p:tgtEl>
+                                          <p:spTgt spid="3">
+                                            <p:txEl>
+                                              <p:pRg st="2" end="2"/>
+                                            </p:txEl>
+                                          </p:spTgt>
+                                        </p:tgtEl>
+                                        <p:attrNameLst>
+                                          <p:attrName>style.visibility</p:attrName>
+                                        </p:attrNameLst>
+                                      </p:cBhvr>
+                                      <p:to>
+                                        <p:strVal val="visible"/>
+                                      </p:to>
+                                    </p:set>
+                                  </p:childTnLst>
+                                </p:cTn>
+                              </p:par>
+                            </p:childTnLst>
+                          </p:cTn>
+                        </p:par>
+                      </p:childTnLst>
+                    </p:cTn>
+                  </p:par>
+                  <p:par>
+                    <p:cTn id="15" fill="hold">
+                      <p:stCondLst>
+                        <p:cond delay="indefinite"/>
+                      </p:stCondLst>
+                      <p:childTnLst>
+                        <p:par>
+                          <p:cTn id="16" fill="hold">
+                            <p:stCondLst>
+                              <p:cond delay="0"/>
+                            </p:stCondLst>
+                            <p:childTnLst>
+                              <p:par>
+                                <p:cTn id="17" presetID="1" presetClass="entr" presetSubtype="0" fill="hold" grpId="0" nodeType="clickEffect">
+                                  <p:stCondLst>
+                                    <p:cond delay="0"/>
+                                  </p:stCondLst>
+                                  <p:childTnLst>
+                                    <p:set>
+                                      <p:cBhvr>
+                                        <p:cTn id="18" dur="1" fill="hold">
+                                          <p:stCondLst>
+                                            <p:cond delay="0"/>
+                                          </p:stCondLst>
+                                        </p:cTn>
+                                        <p:tgtEl>
+                                          <p:spTgt spid="7"/>
+                                        </p:tgtEl>
+                                        <p:attrNameLst>
+                                          <p:attrName>style.visibility</p:attrName>
+                                        </p:attrNameLst>
+                                      </p:cBhvr>
+                                      <p:to>
+                                        <p:strVal val="visible"/>
+                                      </p:to>
+                                    </p:set>
+                                  </p:childTnLst>
+                                </p:cTn>
+                              </p:par>
+                            </p:childTnLst>
+                          </p:cTn>
+                        </p:par>
+                      </p:childTnLst>
+                    </p:cTn>
+                  </p:par>
+                </p:childTnLst>
+              </p:cTn>
+              <p:prevCondLst>
+                <p:cond evt="onPrev" delay="0">
+                  <p:tgtEl>
+                    <p:sldTgt/>
+                  </p:tgtEl>
+                </p:cond>
+              </p:prevCondLst>
+              <p:nextCondLst>
+                <p:cond evt="onNext" delay="0">
+                  <p:tgtEl>
+                    <p:sldTgt/>
+                  </p:tgtEl>
+                </p:cond>
+              </p:nextCondLst>
+            </p:seq>
+          </p:childTnLst>
+        </p:cTn>
+      </p:par>
+    </p:tnLst>
+    <p:bldLst>
+      <p:bldP spid="3" grpId="0" uiExpand="1" build="p" bldLvl="2"/>
+      <p:bldP spid="7" grpId="0" animBg="1"/>
+    </p:bldLst>
+  </p:timing>
+</p:sld>
+</file>
+
+<file path=ppt/slides/slide9.xml><?xml version="1.0" encoding="utf-8"?>
+<p:sld xmlns:a="http://schemas.openxmlformats.org/drawingml/2006/main" xmlns:r="http://schemas.openxmlformats.org/officeDocument/2006/relationships" xmlns:p="http://schemas.openxmlformats.org/presentationml/2006/main">
+  <p:cSld>
+    <p:spTree>
+      <p:nvGrpSpPr>
+        <p:cNvPr id="1" name=""/>
+        <p:cNvGrpSpPr/>
+        <p:nvPr/>
+      </p:nvGrpSpPr>
+      <p:grpSpPr>
+        <a:xfrm>
+          <a:off x="0" y="0"/>
+          <a:ext cx="0" cy="0"/>
+          <a:chOff x="0" y="0"/>
+          <a:chExt cx="0" cy="0"/>
+        </a:xfrm>
+      </p:grpSpPr>
+      <p:sp>
+        <p:nvSpPr>
+          <p:cNvPr id="2" name="Title 1"/>
+          <p:cNvSpPr>
+            <a:spLocks noGrp="1"/>
+          </p:cNvSpPr>
+          <p:nvPr>
+            <p:ph type="title"/>
+          </p:nvPr>
+        </p:nvSpPr>
+        <p:spPr/>
+        <p:txBody>
+          <a:bodyPr/>
+          <a:lstStyle/>
+          <a:p>
+            <a:r>
+              <a:rPr lang="en-US" dirty="0" smtClean="0"/>
+              <a:t>Free lunch?</a:t>
+            </a:r>
+            <a:endParaRPr lang="nl-BE" dirty="0"/>
+          </a:p>
+        </p:txBody>
+      </p:sp>
+      <p:sp>
+        <p:nvSpPr>
+          <p:cNvPr id="3" name="Content Placeholder 2"/>
+          <p:cNvSpPr>
+            <a:spLocks noGrp="1"/>
+          </p:cNvSpPr>
+          <p:nvPr>
+            <p:ph idx="1"/>
+          </p:nvPr>
+        </p:nvSpPr>
+        <p:spPr/>
+        <p:txBody>
+          <a:bodyPr>
+            <a:normAutofit lnSpcReduction="10000"/>
+          </a:bodyPr>
+          <a:lstStyle/>
+          <a:p>
+            <a:r>
+              <a:rPr lang="en-US" dirty="0" smtClean="0"/>
+              <a:t>There </a:t>
+            </a:r>
+            <a:r>
+              <a:rPr lang="en-US" dirty="0" err="1" smtClean="0"/>
+              <a:t>ain't</a:t>
+            </a:r>
+            <a:r>
+              <a:rPr lang="en-US" dirty="0" smtClean="0"/>
+              <a:t> such thing as a free lunch!</a:t>
+            </a:r>
+          </a:p>
+          <a:p>
+            <a:pPr lvl="1"/>
+            <a:r>
+              <a:rPr lang="en-US" dirty="0" smtClean="0"/>
+              <a:t>Memory overhead!</a:t>
+            </a:r>
+          </a:p>
+          <a:p>
+            <a:pPr lvl="1"/>
+            <a:endParaRPr lang="en-US" dirty="0"/>
+          </a:p>
+          <a:p>
+            <a:r>
+              <a:rPr lang="en-US" dirty="0" smtClean="0"/>
+              <a:t>For 10</a:t>
+            </a:r>
+            <a:r>
+              <a:rPr lang="en-US" baseline="30000" dirty="0" smtClean="0"/>
+              <a:t>6</a:t>
+            </a:r>
+            <a:r>
+              <a:rPr lang="en-US" dirty="0" smtClean="0"/>
+              <a:t> points in 2D: factor of 1.8</a:t>
+            </a:r>
+          </a:p>
+          <a:p>
+            <a:pPr lvl="1"/>
+            <a:r>
+              <a:rPr lang="nl-BE" dirty="0" smtClean="0"/>
+              <a:t>54.3 GB</a:t>
+            </a:r>
+          </a:p>
+          <a:p>
+            <a:pPr lvl="1"/>
+            <a:r>
+              <a:rPr lang="en-US" dirty="0" smtClean="0"/>
+              <a:t>includes</a:t>
+            </a:r>
+          </a:p>
+          <a:p>
+            <a:pPr lvl="2"/>
+            <a:r>
+              <a:rPr lang="en-US" dirty="0"/>
+              <a:t>tree (</a:t>
+            </a:r>
+            <a:r>
+              <a:rPr lang="en-US" dirty="0" smtClean="0"/>
+              <a:t>3.2</a:t>
+            </a:r>
+            <a:r>
+              <a:rPr lang="en-US" dirty="0" smtClean="0">
+                <a:sym typeface="Symbol"/>
+              </a:rPr>
+              <a:t></a:t>
+            </a:r>
+            <a:r>
+              <a:rPr lang="en-US" dirty="0" smtClean="0"/>
+              <a:t>10</a:t>
+            </a:r>
+            <a:r>
+              <a:rPr lang="en-US" baseline="30000" dirty="0" smtClean="0"/>
+              <a:t>5</a:t>
+            </a:r>
+            <a:r>
+              <a:rPr lang="en-US" dirty="0" smtClean="0"/>
+              <a:t> nodes of which 2.4</a:t>
+            </a:r>
+            <a:r>
+              <a:rPr lang="en-US" dirty="0">
+                <a:sym typeface="Symbol"/>
+              </a:rPr>
+              <a:t>  </a:t>
+            </a:r>
+            <a:r>
+              <a:rPr lang="en-US" dirty="0" smtClean="0"/>
+              <a:t>10</a:t>
+            </a:r>
+            <a:r>
+              <a:rPr lang="en-US" baseline="30000" dirty="0" smtClean="0"/>
+              <a:t>5</a:t>
+            </a:r>
+            <a:r>
+              <a:rPr lang="en-US" dirty="0" smtClean="0"/>
+              <a:t> leaf nodes)</a:t>
+            </a:r>
+          </a:p>
+          <a:p>
+            <a:pPr lvl="2"/>
+            <a:r>
+              <a:rPr lang="en-US" dirty="0" smtClean="0"/>
+              <a:t>coordinates of each point</a:t>
+            </a:r>
+          </a:p>
+          <a:p>
+            <a:pPr lvl="2"/>
+            <a:r>
+              <a:rPr lang="en-US" dirty="0" smtClean="0"/>
+              <a:t>address for additional data for each point</a:t>
+            </a:r>
+            <a:endParaRPr lang="nl-BE" dirty="0"/>
+          </a:p>
+        </p:txBody>
+      </p:sp>
+      <p:sp>
+        <p:nvSpPr>
+          <p:cNvPr id="4" name="Rectangle 3"/>
+          <p:cNvSpPr/>
+          <p:nvPr/>
+        </p:nvSpPr>
+        <p:spPr>
+          <a:xfrm>
+            <a:off x="1281546" y="2133600"/>
+            <a:ext cx="2899063" cy="457200"/>
+          </a:xfrm>
+          <a:prstGeom prst="rect">
+            <a:avLst/>
+          </a:prstGeom>
+          <a:solidFill>
+            <a:srgbClr val="FF0000">
+              <a:alpha val="23000"/>
+            </a:srgbClr>
+          </a:solidFill>
+          <a:ln>
+            <a:solidFill>
+              <a:srgbClr val="FF0000"/>
+            </a:solidFill>
+          </a:ln>
+        </p:spPr>
+        <p:style>
+          <a:lnRef idx="2">
+            <a:schemeClr val="accent1">
+              <a:shade val="50000"/>
+            </a:schemeClr>
+          </a:lnRef>
+          <a:fillRef idx="1">
+            <a:schemeClr val="accent1"/>
+          </a:fillRef>
+          <a:effectRef idx="0">
+            <a:schemeClr val="accent1"/>
+          </a:effectRef>
+          <a:fontRef idx="minor">
+            <a:schemeClr val="lt1"/>
+          </a:fontRef>
+        </p:style>
+        <p:txBody>
+          <a:bodyPr rtlCol="0" anchor="ctr"/>
+          <a:lstStyle/>
+          <a:p>
+            <a:pPr algn="ctr"/>
+            <a:endParaRPr lang="nl-BE"/>
+          </a:p>
+        </p:txBody>
+      </p:sp>
+    </p:spTree>
+    <p:extLst>
+      <p:ext uri="{BB962C8B-B14F-4D97-AF65-F5344CB8AC3E}">
+        <p14:creationId xmlns:p14="http://schemas.microsoft.com/office/powerpoint/2010/main" val="2310574562"/>
+      </p:ext>
+    </p:extLst>
+  </p:cSld>
+  <p:clrMapOvr>
+    <a:masterClrMapping/>
+  </p:clrMapOvr>
+  <p:timing>
+    <p:tnLst>
+      <p:par>
+        <p:cTn id="1" dur="indefinite" restart="never" nodeType="tmRoot">
+          <p:childTnLst>
+            <p:seq concurrent="1" nextAc="seek">
+              <p:cTn id="2" dur="indefinite" nodeType="mainSeq">
+                <p:childTnLst>
+                  <p:par>
+                    <p:cTn id="3" fill="hold">
+                      <p:stCondLst>
+                        <p:cond delay="indefinite"/>
+                        <p:cond evt="onBegin" delay="0">
+                          <p:tn val="2"/>
+                        </p:cond>
+                      </p:stCondLst>
+                      <p:childTnLst>
+                        <p:par>
+                          <p:cTn id="4" fill="hold">
+                            <p:stCondLst>
+                              <p:cond delay="0"/>
+                            </p:stCondLst>
+                            <p:childTnLst>
+                              <p:par>
+                                <p:cTn id="5" presetID="1" presetClass="entr" presetSubtype="0" fill="hold" grpId="0" nodeType="withEffect">
+                                  <p:stCondLst>
+                                    <p:cond delay="0"/>
+                                  </p:stCondLst>
+                                  <p:childTnLst>
+                                    <p:set>
+                                      <p:cBhvr>
+                                        <p:cTn id="6" dur="1" fill="hold">
+                                          <p:stCondLst>
+                                            <p:cond delay="0"/>
+                                          </p:stCondLst>
+                                        </p:cTn>
+                                        <p:tgtEl>
+                                          <p:spTgt spid="3">
+                                            <p:txEl>
+                                              <p:pRg st="0" end="0"/>
+                                            </p:txEl>
+                                          </p:spTgt>
+                                        </p:tgtEl>
+                                        <p:attrNameLst>
+                                          <p:attrName>style.visibility</p:attrName>
+                                        </p:attrNameLst>
+                                      </p:cBhvr>
+                                      <p:to>
+                                        <p:strVal val="visible"/>
+                                      </p:to>
+                                    </p:set>
+                                  </p:childTnLst>
+                                </p:cTn>
+                              </p:par>
+                            </p:childTnLst>
+                          </p:cTn>
+                        </p:par>
+                      </p:childTnLst>
+                    </p:cTn>
+                  </p:par>
+                  <p:par>
+                    <p:cTn id="7" fill="hold">
+                      <p:stCondLst>
+                        <p:cond delay="indefinite"/>
+                      </p:stCondLst>
+                      <p:childTnLst>
+                        <p:par>
+                          <p:cTn id="8" fill="hold">
+                            <p:stCondLst>
+                              <p:cond delay="0"/>
+                            </p:stCondLst>
+                            <p:childTnLst>
+                              <p:par>
+                                <p:cTn id="9" presetID="1" presetClass="entr" presetSubtype="0" fill="hold" grpId="0" nodeType="clickEffect">
+                                  <p:stCondLst>
+                                    <p:cond delay="0"/>
+                                  </p:stCondLst>
+                                  <p:childTnLst>
+                                    <p:set>
+                                      <p:cBhvr>
+                                        <p:cTn id="10" dur="1" fill="hold">
+                                          <p:stCondLst>
+                                            <p:cond delay="0"/>
+                                          </p:stCondLst>
+                                        </p:cTn>
+                                        <p:tgtEl>
+                                          <p:spTgt spid="3">
+                                            <p:txEl>
+                                              <p:pRg st="1" end="1"/>
+                                            </p:txEl>
+                                          </p:spTgt>
+                                        </p:tgtEl>
+                                        <p:attrNameLst>
+                                          <p:attrName>style.visibility</p:attrName>
+                                        </p:attrNameLst>
+                                      </p:cBhvr>
+                                      <p:to>
+                                        <p:strVal val="visible"/>
+                                      </p:to>
+                                    </p:set>
+                                  </p:childTnLst>
+                                </p:cTn>
+                              </p:par>
+                              <p:par>
+                                <p:cTn id="11" presetID="1" presetClass="entr" presetSubtype="0" fill="hold" grpId="0" nodeType="withEffect">
+                                  <p:stCondLst>
+                                    <p:cond delay="0"/>
+                                  </p:stCondLst>
+                                  <p:childTnLst>
+                                    <p:set>
+                                      <p:cBhvr>
+                                        <p:cTn id="12" dur="1" fill="hold">
+                                          <p:stCondLst>
+                                            <p:cond delay="0"/>
+                                          </p:stCondLst>
+                                        </p:cTn>
+                                        <p:tgtEl>
+                                          <p:spTgt spid="4"/>
+                                        </p:tgtEl>
+                                        <p:attrNameLst>
+                                          <p:attrName>style.visibility</p:attrName>
+                                        </p:attrNameLst>
+                                      </p:cBhvr>
+                                      <p:to>
+                                        <p:strVal val="visible"/>
+                                      </p:to>
+                                    </p:set>
+                                  </p:childTnLst>
+                                </p:cTn>
+                              </p:par>
+                            </p:childTnLst>
+                          </p:cTn>
+                        </p:par>
+                      </p:childTnLst>
+                    </p:cTn>
+                  </p:par>
+                  <p:par>
+                    <p:cTn id="13" fill="hold">
+                      <p:stCondLst>
+                        <p:cond delay="indefinite"/>
+                      </p:stCondLst>
+                      <p:childTnLst>
+                        <p:par>
+                          <p:cTn id="14" fill="hold">
+                            <p:stCondLst>
+                              <p:cond delay="0"/>
+                            </p:stCondLst>
+                            <p:childTnLst>
+                              <p:par>
+                                <p:cTn id="15" presetID="1" presetClass="entr" presetSubtype="0" fill="hold" grpId="0" nodeType="clickEffect">
+                                  <p:stCondLst>
+                                    <p:cond delay="0"/>
+                                  </p:stCondLst>
+                                  <p:childTnLst>
+                                    <p:set>
+                                      <p:cBhvr>
+                                        <p:cTn id="16" dur="1" fill="hold">
+                                          <p:stCondLst>
+                                            <p:cond delay="0"/>
+                                          </p:stCondLst>
+                                        </p:cTn>
+                                        <p:tgtEl>
+                                          <p:spTgt spid="3">
+                                            <p:txEl>
+                                              <p:pRg st="3" end="3"/>
+                                            </p:txEl>
+                                          </p:spTgt>
+                                        </p:tgtEl>
+                                        <p:attrNameLst>
+                                          <p:attrName>style.visibility</p:attrName>
+                                        </p:attrNameLst>
+                                      </p:cBhvr>
+                                      <p:to>
+                                        <p:strVal val="visible"/>
+                                      </p:to>
+                                    </p:set>
+                                  </p:childTnLst>
+                                </p:cTn>
+                              </p:par>
+                            </p:childTnLst>
+                          </p:cTn>
+                        </p:par>
+                      </p:childTnLst>
+                    </p:cTn>
+                  </p:par>
+                  <p:par>
+                    <p:cTn id="17" fill="hold">
+                      <p:stCondLst>
+                        <p:cond delay="indefinite"/>
+                      </p:stCondLst>
+                      <p:childTnLst>
+                        <p:par>
+                          <p:cTn id="18" fill="hold">
+                            <p:stCondLst>
+                              <p:cond delay="0"/>
+                            </p:stCondLst>
+                            <p:childTnLst>
+                              <p:par>
+                                <p:cTn id="19" presetID="1" presetClass="entr" presetSubtype="0" fill="hold" grpId="0" nodeType="clickEffect">
+                                  <p:stCondLst>
+                                    <p:cond delay="0"/>
+                                  </p:stCondLst>
+                                  <p:childTnLst>
+                                    <p:set>
+                                      <p:cBhvr>
+                                        <p:cTn id="20" dur="1" fill="hold">
+                                          <p:stCondLst>
+                                            <p:cond delay="0"/>
+                                          </p:stCondLst>
+                                        </p:cTn>
+                                        <p:tgtEl>
+                                          <p:spTgt spid="3">
+                                            <p:txEl>
+                                              <p:pRg st="4" end="4"/>
+                                            </p:txEl>
+                                          </p:spTgt>
+                                        </p:tgtEl>
+                                        <p:attrNameLst>
+                                          <p:attrName>style.visibility</p:attrName>
+                                        </p:attrNameLst>
+                                      </p:cBhvr>
+                                      <p:to>
+                                        <p:strVal val="visible"/>
+                                      </p:to>
+                                    </p:set>
+                                  </p:childTnLst>
+                                </p:cTn>
+                              </p:par>
+                            </p:childTnLst>
+                          </p:cTn>
+                        </p:par>
+                      </p:childTnLst>
+                    </p:cTn>
+                  </p:par>
+                  <p:par>
+                    <p:cTn id="21" fill="hold">
+                      <p:stCondLst>
+                        <p:cond delay="indefinite"/>
+                      </p:stCondLst>
+                      <p:childTnLst>
+                        <p:par>
+                          <p:cTn id="22" fill="hold">
+                            <p:stCondLst>
+                              <p:cond delay="0"/>
+                            </p:stCondLst>
+                            <p:childTnLst>
+                              <p:par>
+                                <p:cTn id="23" presetID="1" presetClass="entr" presetSubtype="0" fill="hold" grpId="0" nodeType="clickEffect">
+                                  <p:stCondLst>
+                                    <p:cond delay="0"/>
+                                  </p:stCondLst>
+                                  <p:childTnLst>
+                                    <p:set>
+                                      <p:cBhvr>
+                                        <p:cTn id="24" dur="1" fill="hold">
+                                          <p:stCondLst>
+                                            <p:cond delay="0"/>
+                                          </p:stCondLst>
+                                        </p:cTn>
+                                        <p:tgtEl>
+                                          <p:spTgt spid="3">
+                                            <p:txEl>
+                                              <p:pRg st="5" end="5"/>
+                                            </p:txEl>
+                                          </p:spTgt>
+                                        </p:tgtEl>
+                                        <p:attrNameLst>
+                                          <p:attrName>style.visibility</p:attrName>
+                                        </p:attrNameLst>
+                                      </p:cBhvr>
+                                      <p:to>
+                                        <p:strVal val="visible"/>
+                                      </p:to>
+                                    </p:set>
+                                  </p:childTnLst>
+                                </p:cTn>
+                              </p:par>
+                              <p:par>
+                                <p:cTn id="25" presetID="1" presetClass="entr" presetSubtype="0" fill="hold" grpId="0" nodeType="withEffect">
+                                  <p:stCondLst>
+                                    <p:cond delay="0"/>
+                                  </p:stCondLst>
+                                  <p:childTnLst>
+                                    <p:set>
+                                      <p:cBhvr>
+                                        <p:cTn id="26" dur="1" fill="hold">
+                                          <p:stCondLst>
+                                            <p:cond delay="0"/>
+                                          </p:stCondLst>
+                                        </p:cTn>
+                                        <p:tgtEl>
+                                          <p:spTgt spid="3">
+                                            <p:txEl>
+                                              <p:pRg st="6" end="6"/>
+                                            </p:txEl>
+                                          </p:spTgt>
+                                        </p:tgtEl>
+                                        <p:attrNameLst>
+                                          <p:attrName>style.visibility</p:attrName>
+                                        </p:attrNameLst>
+                                      </p:cBhvr>
+                                      <p:to>
+                                        <p:strVal val="visible"/>
+                                      </p:to>
+                                    </p:set>
+                                  </p:childTnLst>
+                                </p:cTn>
+                              </p:par>
+                              <p:par>
+                                <p:cTn id="27" presetID="1" presetClass="entr" presetSubtype="0" fill="hold" grpId="0" nodeType="withEffect">
+                                  <p:stCondLst>
+                                    <p:cond delay="0"/>
+                                  </p:stCondLst>
+                                  <p:childTnLst>
+                                    <p:set>
+                                      <p:cBhvr>
+                                        <p:cTn id="28" dur="1" fill="hold">
+                                          <p:stCondLst>
+                                            <p:cond delay="0"/>
+                                          </p:stCondLst>
+                                        </p:cTn>
+                                        <p:tgtEl>
+                                          <p:spTgt spid="3">
+                                            <p:txEl>
+                                              <p:pRg st="7" end="7"/>
+                                            </p:txEl>
+                                          </p:spTgt>
+                                        </p:tgtEl>
+                                        <p:attrNameLst>
+                                          <p:attrName>style.visibility</p:attrName>
+                                        </p:attrNameLst>
+                                      </p:cBhvr>
+                                      <p:to>
+                                        <p:strVal val="visible"/>
+                                      </p:to>
+                                    </p:set>
+                                  </p:childTnLst>
+                                </p:cTn>
+                              </p:par>
+                              <p:par>
+                                <p:cTn id="29" presetID="1" presetClass="entr" presetSubtype="0" fill="hold" grpId="0" nodeType="withEffect">
+                                  <p:stCondLst>
+                                    <p:cond delay="0"/>
+                                  </p:stCondLst>
+                                  <p:childTnLst>
+                                    <p:set>
+                                      <p:cBhvr>
+                                        <p:cTn id="30" dur="1" fill="hold">
+                                          <p:stCondLst>
+                                            <p:cond delay="0"/>
+                                          </p:stCondLst>
+                                        </p:cTn>
+                                        <p:tgtEl>
+                                          <p:spTgt spid="3">
+                                            <p:txEl>
+                                              <p:pRg st="8" end="8"/>
+                                            </p:txEl>
+                                          </p:spTgt>
+                                        </p:tgtEl>
+                                        <p:attrNameLst>
+                                          <p:attrName>style.visibility</p:attrName>
+                                        </p:attrNameLst>
+                                      </p:cBhvr>
+                                      <p:to>
+                                        <p:strVal val="visible"/>
+                                      </p:to>
+                                    </p:set>
+                                  </p:childTnLst>
+                                </p:cTn>
+                              </p:par>
+                            </p:childTnLst>
+                          </p:cTn>
+                        </p:par>
+                      </p:childTnLst>
+                    </p:cTn>
+                  </p:par>
+                </p:childTnLst>
+              </p:cTn>
+              <p:prevCondLst>
+                <p:cond evt="onPrev" delay="0">
+                  <p:tgtEl>
+                    <p:sldTgt/>
+                  </p:tgtEl>
+                </p:cond>
+              </p:prevCondLst>
+              <p:nextCondLst>
+                <p:cond evt="onNext" delay="0">
+                  <p:tgtEl>
+                    <p:sldTgt/>
+                  </p:tgtEl>
+                </p:cond>
+              </p:nextCondLst>
+            </p:seq>
+          </p:childTnLst>
+        </p:cTn>
+      </p:par>
+    </p:tnLst>
+    <p:bldLst>
+      <p:bldP spid="3" grpId="0" uiExpand="1" build="p" bldLvl="2"/>
+      <p:bldP spid="4" grpId="0" animBg="1"/>
+    </p:bldLst>
+  </p:timing>
+</p:sld>
+</file>
+
 <file path=ppt/theme/theme1.xml><?xml version="1.0" encoding="utf-8"?>
 <a:theme xmlns:a="http://schemas.openxmlformats.org/drawingml/2006/main" name="Office Theme">
   <a:themeElements>

</xml_diff>

<commit_message>
Added slide on inserting points; tradeoffs
</commit_message>
<xml_diff>
--- a/C/Tree_2k/tree_2k.pptx
+++ b/C/Tree_2k/tree_2k.pptx
@@ -14,6 +14,9 @@
     <p:sldId id="262" r:id="rId8"/>
     <p:sldId id="263" r:id="rId9"/>
     <p:sldId id="264" r:id="rId10"/>
+    <p:sldId id="265" r:id="rId11"/>
+    <p:sldId id="266" r:id="rId12"/>
+    <p:sldId id="267" r:id="rId13"/>
   </p:sldIdLst>
   <p:sldSz cx="9144000" cy="6858000" type="screen4x3"/>
   <p:notesSz cx="6858000" cy="9144000"/>
@@ -297,7 +300,7 @@
             <a:fld id="{1D8BD707-D9CF-40AE-B4C6-C98DA3205C09}" type="datetimeFigureOut">
               <a:rPr lang="en-US" smtClean="0"/>
               <a:pPr/>
-              <a:t>2016-01-13</a:t>
+              <a:t>2016-01-14</a:t>
             </a:fld>
             <a:endParaRPr lang="en-US"/>
           </a:p>
@@ -464,7 +467,7 @@
             <a:fld id="{1D8BD707-D9CF-40AE-B4C6-C98DA3205C09}" type="datetimeFigureOut">
               <a:rPr lang="en-US" smtClean="0"/>
               <a:pPr/>
-              <a:t>2016-01-13</a:t>
+              <a:t>2016-01-14</a:t>
             </a:fld>
             <a:endParaRPr lang="en-US"/>
           </a:p>
@@ -641,7 +644,7 @@
             <a:fld id="{1D8BD707-D9CF-40AE-B4C6-C98DA3205C09}" type="datetimeFigureOut">
               <a:rPr lang="en-US" smtClean="0"/>
               <a:pPr/>
-              <a:t>2016-01-13</a:t>
+              <a:t>2016-01-14</a:t>
             </a:fld>
             <a:endParaRPr lang="en-US"/>
           </a:p>
@@ -808,7 +811,7 @@
             <a:fld id="{1D8BD707-D9CF-40AE-B4C6-C98DA3205C09}" type="datetimeFigureOut">
               <a:rPr lang="en-US" smtClean="0"/>
               <a:pPr/>
-              <a:t>2016-01-13</a:t>
+              <a:t>2016-01-14</a:t>
             </a:fld>
             <a:endParaRPr lang="en-US"/>
           </a:p>
@@ -1051,7 +1054,7 @@
             <a:fld id="{1D8BD707-D9CF-40AE-B4C6-C98DA3205C09}" type="datetimeFigureOut">
               <a:rPr lang="en-US" smtClean="0"/>
               <a:pPr/>
-              <a:t>2016-01-13</a:t>
+              <a:t>2016-01-14</a:t>
             </a:fld>
             <a:endParaRPr lang="en-US"/>
           </a:p>
@@ -1336,7 +1339,7 @@
             <a:fld id="{1D8BD707-D9CF-40AE-B4C6-C98DA3205C09}" type="datetimeFigureOut">
               <a:rPr lang="en-US" smtClean="0"/>
               <a:pPr/>
-              <a:t>2016-01-13</a:t>
+              <a:t>2016-01-14</a:t>
             </a:fld>
             <a:endParaRPr lang="en-US"/>
           </a:p>
@@ -1755,7 +1758,7 @@
             <a:fld id="{1D8BD707-D9CF-40AE-B4C6-C98DA3205C09}" type="datetimeFigureOut">
               <a:rPr lang="en-US" smtClean="0"/>
               <a:pPr/>
-              <a:t>2016-01-13</a:t>
+              <a:t>2016-01-14</a:t>
             </a:fld>
             <a:endParaRPr lang="en-US"/>
           </a:p>
@@ -1870,7 +1873,7 @@
             <a:fld id="{1D8BD707-D9CF-40AE-B4C6-C98DA3205C09}" type="datetimeFigureOut">
               <a:rPr lang="en-US" smtClean="0"/>
               <a:pPr/>
-              <a:t>2016-01-13</a:t>
+              <a:t>2016-01-14</a:t>
             </a:fld>
             <a:endParaRPr lang="en-US"/>
           </a:p>
@@ -1962,7 +1965,7 @@
             <a:fld id="{1D8BD707-D9CF-40AE-B4C6-C98DA3205C09}" type="datetimeFigureOut">
               <a:rPr lang="en-US" smtClean="0"/>
               <a:pPr/>
-              <a:t>2016-01-13</a:t>
+              <a:t>2016-01-14</a:t>
             </a:fld>
             <a:endParaRPr lang="en-US"/>
           </a:p>
@@ -2236,7 +2239,7 @@
             <a:fld id="{1D8BD707-D9CF-40AE-B4C6-C98DA3205C09}" type="datetimeFigureOut">
               <a:rPr lang="en-US" smtClean="0"/>
               <a:pPr/>
-              <a:t>2016-01-13</a:t>
+              <a:t>2016-01-14</a:t>
             </a:fld>
             <a:endParaRPr lang="en-US"/>
           </a:p>
@@ -2486,7 +2489,7 @@
             <a:fld id="{1D8BD707-D9CF-40AE-B4C6-C98DA3205C09}" type="datetimeFigureOut">
               <a:rPr lang="en-US" smtClean="0"/>
               <a:pPr/>
-              <a:t>2016-01-13</a:t>
+              <a:t>2016-01-14</a:t>
             </a:fld>
             <a:endParaRPr lang="en-US"/>
           </a:p>
@@ -2696,7 +2699,7 @@
             <a:fld id="{1D8BD707-D9CF-40AE-B4C6-C98DA3205C09}" type="datetimeFigureOut">
               <a:rPr lang="en-US" smtClean="0"/>
               <a:pPr/>
-              <a:t>2016-01-13</a:t>
+              <a:t>2016-01-14</a:t>
             </a:fld>
             <a:endParaRPr lang="en-US"/>
           </a:p>
@@ -3145,6 +3148,883 @@
 </p:sld>
 </file>
 
+<file path=ppt/slides/slide10.xml><?xml version="1.0" encoding="utf-8"?>
+<p:sld xmlns:a="http://schemas.openxmlformats.org/drawingml/2006/main" xmlns:r="http://schemas.openxmlformats.org/officeDocument/2006/relationships" xmlns:p="http://schemas.openxmlformats.org/presentationml/2006/main">
+  <p:cSld>
+    <p:spTree>
+      <p:nvGrpSpPr>
+        <p:cNvPr id="1" name=""/>
+        <p:cNvGrpSpPr/>
+        <p:nvPr/>
+      </p:nvGrpSpPr>
+      <p:grpSpPr>
+        <a:xfrm>
+          <a:off x="0" y="0"/>
+          <a:ext cx="0" cy="0"/>
+          <a:chOff x="0" y="0"/>
+          <a:chExt cx="0" cy="0"/>
+        </a:xfrm>
+      </p:grpSpPr>
+      <p:sp>
+        <p:nvSpPr>
+          <p:cNvPr id="2" name="Title 1"/>
+          <p:cNvSpPr>
+            <a:spLocks noGrp="1"/>
+          </p:cNvSpPr>
+          <p:nvPr>
+            <p:ph type="title"/>
+          </p:nvPr>
+        </p:nvSpPr>
+        <p:spPr/>
+        <p:txBody>
+          <a:bodyPr/>
+          <a:lstStyle/>
+          <a:p>
+            <a:r>
+              <a:rPr lang="en-US" dirty="0" smtClean="0"/>
+              <a:t>Cover charge</a:t>
+            </a:r>
+            <a:endParaRPr lang="nl-BE" dirty="0"/>
+          </a:p>
+        </p:txBody>
+      </p:sp>
+      <p:sp>
+        <p:nvSpPr>
+          <p:cNvPr id="3" name="Content Placeholder 2"/>
+          <p:cNvSpPr>
+            <a:spLocks noGrp="1"/>
+          </p:cNvSpPr>
+          <p:nvPr>
+            <p:ph idx="1"/>
+          </p:nvPr>
+        </p:nvSpPr>
+        <p:spPr/>
+        <p:txBody>
+          <a:bodyPr/>
+          <a:lstStyle/>
+          <a:p>
+            <a:r>
+              <a:rPr lang="en-US" dirty="0" smtClean="0"/>
+              <a:t>Construction of tree takes time</a:t>
+            </a:r>
+            <a:endParaRPr lang="nl-BE" dirty="0"/>
+          </a:p>
+        </p:txBody>
+      </p:sp>
+      <p:pic>
+        <p:nvPicPr>
+          <p:cNvPr id="21" name="Picture 20"/>
+          <p:cNvPicPr>
+            <a:picLocks noChangeAspect="1"/>
+          </p:cNvPicPr>
+          <p:nvPr/>
+        </p:nvPicPr>
+        <p:blipFill>
+          <a:blip r:embed="rId2">
+            <a:extLst>
+              <a:ext uri="{28A0092B-C50C-407E-A947-70E740481C1C}">
+                <a14:useLocalDpi xmlns:a14="http://schemas.microsoft.com/office/drawing/2010/main" val="0"/>
+              </a:ext>
+            </a:extLst>
+          </a:blip>
+          <a:stretch>
+            <a:fillRect/>
+          </a:stretch>
+        </p:blipFill>
+        <p:spPr>
+          <a:xfrm>
+            <a:off x="1143000" y="2147783"/>
+            <a:ext cx="6400800" cy="4484260"/>
+          </a:xfrm>
+          <a:prstGeom prst="rect">
+            <a:avLst/>
+          </a:prstGeom>
+        </p:spPr>
+      </p:pic>
+    </p:spTree>
+    <p:extLst>
+      <p:ext uri="{BB962C8B-B14F-4D97-AF65-F5344CB8AC3E}">
+        <p14:creationId xmlns:p14="http://schemas.microsoft.com/office/powerpoint/2010/main" val="3547311053"/>
+      </p:ext>
+    </p:extLst>
+  </p:cSld>
+  <p:clrMapOvr>
+    <a:masterClrMapping/>
+  </p:clrMapOvr>
+  <p:timing>
+    <p:tnLst>
+      <p:par>
+        <p:cTn id="1" dur="indefinite" restart="never" nodeType="tmRoot"/>
+      </p:par>
+    </p:tnLst>
+  </p:timing>
+</p:sld>
+</file>
+
+<file path=ppt/slides/slide11.xml><?xml version="1.0" encoding="utf-8"?>
+<p:sld xmlns:a="http://schemas.openxmlformats.org/drawingml/2006/main" xmlns:r="http://schemas.openxmlformats.org/officeDocument/2006/relationships" xmlns:p="http://schemas.openxmlformats.org/presentationml/2006/main">
+  <p:cSld>
+    <p:spTree>
+      <p:nvGrpSpPr>
+        <p:cNvPr id="1" name=""/>
+        <p:cNvGrpSpPr/>
+        <p:nvPr/>
+      </p:nvGrpSpPr>
+      <p:grpSpPr>
+        <a:xfrm>
+          <a:off x="0" y="0"/>
+          <a:ext cx="0" cy="0"/>
+          <a:chOff x="0" y="0"/>
+          <a:chExt cx="0" cy="0"/>
+        </a:xfrm>
+      </p:grpSpPr>
+      <p:sp>
+        <p:nvSpPr>
+          <p:cNvPr id="2" name="Title 1"/>
+          <p:cNvSpPr>
+            <a:spLocks noGrp="1"/>
+          </p:cNvSpPr>
+          <p:nvPr>
+            <p:ph type="title"/>
+          </p:nvPr>
+        </p:nvSpPr>
+        <p:spPr/>
+        <p:txBody>
+          <a:bodyPr/>
+          <a:lstStyle/>
+          <a:p>
+            <a:r>
+              <a:rPr lang="en-US" dirty="0" smtClean="0"/>
+              <a:t>Tradeoffs</a:t>
+            </a:r>
+            <a:endParaRPr lang="nl-BE" dirty="0"/>
+          </a:p>
+        </p:txBody>
+      </p:sp>
+      <p:sp>
+        <p:nvSpPr>
+          <p:cNvPr id="3" name="Content Placeholder 2"/>
+          <p:cNvSpPr>
+            <a:spLocks noGrp="1"/>
+          </p:cNvSpPr>
+          <p:nvPr>
+            <p:ph idx="1"/>
+          </p:nvPr>
+        </p:nvSpPr>
+        <p:spPr/>
+        <p:txBody>
+          <a:bodyPr/>
+          <a:lstStyle/>
+          <a:p>
+            <a:r>
+              <a:rPr lang="en-US" dirty="0" smtClean="0"/>
+              <a:t>Execution time vs. memory overhead</a:t>
+            </a:r>
+          </a:p>
+          <a:p>
+            <a:r>
+              <a:rPr lang="en-US" dirty="0" smtClean="0"/>
+              <a:t>Number of queries vs. time to build tree</a:t>
+            </a:r>
+          </a:p>
+          <a:p>
+            <a:r>
+              <a:rPr lang="en-US" dirty="0" smtClean="0"/>
+              <a:t>Number of expected results vs. query method</a:t>
+            </a:r>
+          </a:p>
+          <a:p>
+            <a:r>
+              <a:rPr lang="en-US" dirty="0" smtClean="0"/>
+              <a:t>Bucket size vs. query time</a:t>
+            </a:r>
+          </a:p>
+          <a:p>
+            <a:r>
+              <a:rPr lang="en-US" dirty="0" smtClean="0"/>
+              <a:t>Bucket size vs. memory overhead</a:t>
+            </a:r>
+          </a:p>
+          <a:p>
+            <a:endParaRPr lang="nl-BE" dirty="0"/>
+          </a:p>
+        </p:txBody>
+      </p:sp>
+      <p:sp>
+        <p:nvSpPr>
+          <p:cNvPr id="4" name="TextBox 3"/>
+          <p:cNvSpPr txBox="1"/>
+          <p:nvPr/>
+        </p:nvSpPr>
+        <p:spPr>
+          <a:xfrm>
+            <a:off x="424391" y="5014403"/>
+            <a:ext cx="8299773" cy="1200329"/>
+          </a:xfrm>
+          <a:prstGeom prst="rect">
+            <a:avLst/>
+          </a:prstGeom>
+          <a:noFill/>
+          <a:ln>
+            <a:solidFill>
+              <a:schemeClr val="tx1"/>
+            </a:solidFill>
+          </a:ln>
+        </p:spPr>
+        <p:txBody>
+          <a:bodyPr wrap="none" rtlCol="0">
+            <a:spAutoFit/>
+          </a:bodyPr>
+          <a:lstStyle/>
+          <a:p>
+            <a:pPr algn="ctr"/>
+            <a:r>
+              <a:rPr lang="en-US" sz="3600" dirty="0" smtClean="0"/>
+              <a:t>Subtle considerations:</a:t>
+            </a:r>
+          </a:p>
+          <a:p>
+            <a:pPr algn="ctr"/>
+            <a:r>
+              <a:rPr lang="en-US" sz="3600" dirty="0" smtClean="0"/>
+              <a:t>know your problem, know your algorithms!</a:t>
+            </a:r>
+            <a:endParaRPr lang="nl-BE" sz="3600" dirty="0"/>
+          </a:p>
+        </p:txBody>
+      </p:sp>
+    </p:spTree>
+    <p:extLst>
+      <p:ext uri="{BB962C8B-B14F-4D97-AF65-F5344CB8AC3E}">
+        <p14:creationId xmlns:p14="http://schemas.microsoft.com/office/powerpoint/2010/main" val="3882185707"/>
+      </p:ext>
+    </p:extLst>
+  </p:cSld>
+  <p:clrMapOvr>
+    <a:masterClrMapping/>
+  </p:clrMapOvr>
+  <p:timing>
+    <p:tnLst>
+      <p:par>
+        <p:cTn id="1" dur="indefinite" restart="never" nodeType="tmRoot">
+          <p:childTnLst>
+            <p:seq concurrent="1" nextAc="seek">
+              <p:cTn id="2" dur="indefinite" nodeType="mainSeq">
+                <p:childTnLst>
+                  <p:par>
+                    <p:cTn id="3" fill="hold">
+                      <p:stCondLst>
+                        <p:cond delay="indefinite"/>
+                        <p:cond evt="onBegin" delay="0">
+                          <p:tn val="2"/>
+                        </p:cond>
+                      </p:stCondLst>
+                      <p:childTnLst>
+                        <p:par>
+                          <p:cTn id="4" fill="hold">
+                            <p:stCondLst>
+                              <p:cond delay="0"/>
+                            </p:stCondLst>
+                            <p:childTnLst>
+                              <p:par>
+                                <p:cTn id="5" presetID="1" presetClass="entr" presetSubtype="0" fill="hold" grpId="0" nodeType="withEffect">
+                                  <p:stCondLst>
+                                    <p:cond delay="0"/>
+                                  </p:stCondLst>
+                                  <p:childTnLst>
+                                    <p:set>
+                                      <p:cBhvr>
+                                        <p:cTn id="6" dur="1" fill="hold">
+                                          <p:stCondLst>
+                                            <p:cond delay="0"/>
+                                          </p:stCondLst>
+                                        </p:cTn>
+                                        <p:tgtEl>
+                                          <p:spTgt spid="3">
+                                            <p:txEl>
+                                              <p:pRg st="0" end="0"/>
+                                            </p:txEl>
+                                          </p:spTgt>
+                                        </p:tgtEl>
+                                        <p:attrNameLst>
+                                          <p:attrName>style.visibility</p:attrName>
+                                        </p:attrNameLst>
+                                      </p:cBhvr>
+                                      <p:to>
+                                        <p:strVal val="visible"/>
+                                      </p:to>
+                                    </p:set>
+                                  </p:childTnLst>
+                                </p:cTn>
+                              </p:par>
+                            </p:childTnLst>
+                          </p:cTn>
+                        </p:par>
+                      </p:childTnLst>
+                    </p:cTn>
+                  </p:par>
+                  <p:par>
+                    <p:cTn id="7" fill="hold">
+                      <p:stCondLst>
+                        <p:cond delay="indefinite"/>
+                      </p:stCondLst>
+                      <p:childTnLst>
+                        <p:par>
+                          <p:cTn id="8" fill="hold">
+                            <p:stCondLst>
+                              <p:cond delay="0"/>
+                            </p:stCondLst>
+                            <p:childTnLst>
+                              <p:par>
+                                <p:cTn id="9" presetID="1" presetClass="entr" presetSubtype="0" fill="hold" grpId="0" nodeType="clickEffect">
+                                  <p:stCondLst>
+                                    <p:cond delay="0"/>
+                                  </p:stCondLst>
+                                  <p:childTnLst>
+                                    <p:set>
+                                      <p:cBhvr>
+                                        <p:cTn id="10" dur="1" fill="hold">
+                                          <p:stCondLst>
+                                            <p:cond delay="0"/>
+                                          </p:stCondLst>
+                                        </p:cTn>
+                                        <p:tgtEl>
+                                          <p:spTgt spid="3">
+                                            <p:txEl>
+                                              <p:pRg st="1" end="1"/>
+                                            </p:txEl>
+                                          </p:spTgt>
+                                        </p:tgtEl>
+                                        <p:attrNameLst>
+                                          <p:attrName>style.visibility</p:attrName>
+                                        </p:attrNameLst>
+                                      </p:cBhvr>
+                                      <p:to>
+                                        <p:strVal val="visible"/>
+                                      </p:to>
+                                    </p:set>
+                                  </p:childTnLst>
+                                </p:cTn>
+                              </p:par>
+                            </p:childTnLst>
+                          </p:cTn>
+                        </p:par>
+                      </p:childTnLst>
+                    </p:cTn>
+                  </p:par>
+                  <p:par>
+                    <p:cTn id="11" fill="hold">
+                      <p:stCondLst>
+                        <p:cond delay="indefinite"/>
+                      </p:stCondLst>
+                      <p:childTnLst>
+                        <p:par>
+                          <p:cTn id="12" fill="hold">
+                            <p:stCondLst>
+                              <p:cond delay="0"/>
+                            </p:stCondLst>
+                            <p:childTnLst>
+                              <p:par>
+                                <p:cTn id="13" presetID="1" presetClass="entr" presetSubtype="0" fill="hold" grpId="0" nodeType="clickEffect">
+                                  <p:stCondLst>
+                                    <p:cond delay="0"/>
+                                  </p:stCondLst>
+                                  <p:childTnLst>
+                                    <p:set>
+                                      <p:cBhvr>
+                                        <p:cTn id="14" dur="1" fill="hold">
+                                          <p:stCondLst>
+                                            <p:cond delay="0"/>
+                                          </p:stCondLst>
+                                        </p:cTn>
+                                        <p:tgtEl>
+                                          <p:spTgt spid="3">
+                                            <p:txEl>
+                                              <p:pRg st="2" end="2"/>
+                                            </p:txEl>
+                                          </p:spTgt>
+                                        </p:tgtEl>
+                                        <p:attrNameLst>
+                                          <p:attrName>style.visibility</p:attrName>
+                                        </p:attrNameLst>
+                                      </p:cBhvr>
+                                      <p:to>
+                                        <p:strVal val="visible"/>
+                                      </p:to>
+                                    </p:set>
+                                  </p:childTnLst>
+                                </p:cTn>
+                              </p:par>
+                            </p:childTnLst>
+                          </p:cTn>
+                        </p:par>
+                      </p:childTnLst>
+                    </p:cTn>
+                  </p:par>
+                  <p:par>
+                    <p:cTn id="15" fill="hold">
+                      <p:stCondLst>
+                        <p:cond delay="indefinite"/>
+                      </p:stCondLst>
+                      <p:childTnLst>
+                        <p:par>
+                          <p:cTn id="16" fill="hold">
+                            <p:stCondLst>
+                              <p:cond delay="0"/>
+                            </p:stCondLst>
+                            <p:childTnLst>
+                              <p:par>
+                                <p:cTn id="17" presetID="1" presetClass="entr" presetSubtype="0" fill="hold" grpId="0" nodeType="clickEffect">
+                                  <p:stCondLst>
+                                    <p:cond delay="0"/>
+                                  </p:stCondLst>
+                                  <p:childTnLst>
+                                    <p:set>
+                                      <p:cBhvr>
+                                        <p:cTn id="18" dur="1" fill="hold">
+                                          <p:stCondLst>
+                                            <p:cond delay="0"/>
+                                          </p:stCondLst>
+                                        </p:cTn>
+                                        <p:tgtEl>
+                                          <p:spTgt spid="3">
+                                            <p:txEl>
+                                              <p:pRg st="3" end="3"/>
+                                            </p:txEl>
+                                          </p:spTgt>
+                                        </p:tgtEl>
+                                        <p:attrNameLst>
+                                          <p:attrName>style.visibility</p:attrName>
+                                        </p:attrNameLst>
+                                      </p:cBhvr>
+                                      <p:to>
+                                        <p:strVal val="visible"/>
+                                      </p:to>
+                                    </p:set>
+                                  </p:childTnLst>
+                                </p:cTn>
+                              </p:par>
+                            </p:childTnLst>
+                          </p:cTn>
+                        </p:par>
+                      </p:childTnLst>
+                    </p:cTn>
+                  </p:par>
+                  <p:par>
+                    <p:cTn id="19" fill="hold">
+                      <p:stCondLst>
+                        <p:cond delay="indefinite"/>
+                      </p:stCondLst>
+                      <p:childTnLst>
+                        <p:par>
+                          <p:cTn id="20" fill="hold">
+                            <p:stCondLst>
+                              <p:cond delay="0"/>
+                            </p:stCondLst>
+                            <p:childTnLst>
+                              <p:par>
+                                <p:cTn id="21" presetID="1" presetClass="entr" presetSubtype="0" fill="hold" grpId="0" nodeType="clickEffect">
+                                  <p:stCondLst>
+                                    <p:cond delay="0"/>
+                                  </p:stCondLst>
+                                  <p:childTnLst>
+                                    <p:set>
+                                      <p:cBhvr>
+                                        <p:cTn id="22" dur="1" fill="hold">
+                                          <p:stCondLst>
+                                            <p:cond delay="0"/>
+                                          </p:stCondLst>
+                                        </p:cTn>
+                                        <p:tgtEl>
+                                          <p:spTgt spid="3">
+                                            <p:txEl>
+                                              <p:pRg st="4" end="4"/>
+                                            </p:txEl>
+                                          </p:spTgt>
+                                        </p:tgtEl>
+                                        <p:attrNameLst>
+                                          <p:attrName>style.visibility</p:attrName>
+                                        </p:attrNameLst>
+                                      </p:cBhvr>
+                                      <p:to>
+                                        <p:strVal val="visible"/>
+                                      </p:to>
+                                    </p:set>
+                                  </p:childTnLst>
+                                </p:cTn>
+                              </p:par>
+                            </p:childTnLst>
+                          </p:cTn>
+                        </p:par>
+                      </p:childTnLst>
+                    </p:cTn>
+                  </p:par>
+                  <p:par>
+                    <p:cTn id="23" fill="hold">
+                      <p:stCondLst>
+                        <p:cond delay="indefinite"/>
+                      </p:stCondLst>
+                      <p:childTnLst>
+                        <p:par>
+                          <p:cTn id="24" fill="hold">
+                            <p:stCondLst>
+                              <p:cond delay="0"/>
+                            </p:stCondLst>
+                            <p:childTnLst>
+                              <p:par>
+                                <p:cTn id="25" presetID="1" presetClass="entr" presetSubtype="0" fill="hold" grpId="0" nodeType="clickEffect">
+                                  <p:stCondLst>
+                                    <p:cond delay="0"/>
+                                  </p:stCondLst>
+                                  <p:childTnLst>
+                                    <p:set>
+                                      <p:cBhvr>
+                                        <p:cTn id="26" dur="1" fill="hold">
+                                          <p:stCondLst>
+                                            <p:cond delay="0"/>
+                                          </p:stCondLst>
+                                        </p:cTn>
+                                        <p:tgtEl>
+                                          <p:spTgt spid="4"/>
+                                        </p:tgtEl>
+                                        <p:attrNameLst>
+                                          <p:attrName>style.visibility</p:attrName>
+                                        </p:attrNameLst>
+                                      </p:cBhvr>
+                                      <p:to>
+                                        <p:strVal val="visible"/>
+                                      </p:to>
+                                    </p:set>
+                                  </p:childTnLst>
+                                </p:cTn>
+                              </p:par>
+                            </p:childTnLst>
+                          </p:cTn>
+                        </p:par>
+                      </p:childTnLst>
+                    </p:cTn>
+                  </p:par>
+                </p:childTnLst>
+              </p:cTn>
+              <p:prevCondLst>
+                <p:cond evt="onPrev" delay="0">
+                  <p:tgtEl>
+                    <p:sldTgt/>
+                  </p:tgtEl>
+                </p:cond>
+              </p:prevCondLst>
+              <p:nextCondLst>
+                <p:cond evt="onNext" delay="0">
+                  <p:tgtEl>
+                    <p:sldTgt/>
+                  </p:tgtEl>
+                </p:cond>
+              </p:nextCondLst>
+            </p:seq>
+          </p:childTnLst>
+        </p:cTn>
+      </p:par>
+    </p:tnLst>
+    <p:bldLst>
+      <p:bldP spid="3" grpId="0" uiExpand="1" build="p"/>
+      <p:bldP spid="4" grpId="0" animBg="1"/>
+    </p:bldLst>
+  </p:timing>
+</p:sld>
+</file>
+
+<file path=ppt/slides/slide12.xml><?xml version="1.0" encoding="utf-8"?>
+<p:sld xmlns:a="http://schemas.openxmlformats.org/drawingml/2006/main" xmlns:r="http://schemas.openxmlformats.org/officeDocument/2006/relationships" xmlns:p="http://schemas.openxmlformats.org/presentationml/2006/main">
+  <p:cSld>
+    <p:spTree>
+      <p:nvGrpSpPr>
+        <p:cNvPr id="1" name=""/>
+        <p:cNvGrpSpPr/>
+        <p:nvPr/>
+      </p:nvGrpSpPr>
+      <p:grpSpPr>
+        <a:xfrm>
+          <a:off x="0" y="0"/>
+          <a:ext cx="0" cy="0"/>
+          <a:chOff x="0" y="0"/>
+          <a:chExt cx="0" cy="0"/>
+        </a:xfrm>
+      </p:grpSpPr>
+      <p:sp>
+        <p:nvSpPr>
+          <p:cNvPr id="2" name="Title 1"/>
+          <p:cNvSpPr>
+            <a:spLocks noGrp="1"/>
+          </p:cNvSpPr>
+          <p:nvPr>
+            <p:ph type="title"/>
+          </p:nvPr>
+        </p:nvSpPr>
+        <p:spPr/>
+        <p:txBody>
+          <a:bodyPr/>
+          <a:lstStyle/>
+          <a:p>
+            <a:r>
+              <a:rPr lang="en-US" dirty="0" smtClean="0"/>
+              <a:t>Room for improvement</a:t>
+            </a:r>
+            <a:endParaRPr lang="nl-BE" dirty="0"/>
+          </a:p>
+        </p:txBody>
+      </p:sp>
+      <p:sp>
+        <p:nvSpPr>
+          <p:cNvPr id="3" name="Content Placeholder 2"/>
+          <p:cNvSpPr>
+            <a:spLocks noGrp="1"/>
+          </p:cNvSpPr>
+          <p:nvPr>
+            <p:ph idx="1"/>
+          </p:nvPr>
+        </p:nvSpPr>
+        <p:spPr/>
+        <p:txBody>
+          <a:bodyPr/>
+          <a:lstStyle/>
+          <a:p>
+            <a:r>
+              <a:rPr lang="en-US" dirty="0" smtClean="0"/>
+              <a:t>What about removing points?</a:t>
+            </a:r>
+          </a:p>
+          <a:p>
+            <a:pPr lvl="1"/>
+            <a:r>
+              <a:rPr lang="en-US" dirty="0" smtClean="0"/>
+              <a:t>again, tradeoff between memory and compute time</a:t>
+            </a:r>
+          </a:p>
+          <a:p>
+            <a:r>
+              <a:rPr lang="en-US" dirty="0" smtClean="0"/>
+              <a:t>Is the data structure optimal?</a:t>
+            </a:r>
+          </a:p>
+          <a:p>
+            <a:pPr lvl="1"/>
+            <a:r>
+              <a:rPr lang="en-US" dirty="0" smtClean="0"/>
+              <a:t>many allocations, but easily avoided (how?)</a:t>
+            </a:r>
+            <a:endParaRPr lang="nl-BE" dirty="0"/>
+          </a:p>
+        </p:txBody>
+      </p:sp>
+    </p:spTree>
+    <p:extLst>
+      <p:ext uri="{BB962C8B-B14F-4D97-AF65-F5344CB8AC3E}">
+        <p14:creationId xmlns:p14="http://schemas.microsoft.com/office/powerpoint/2010/main" val="1244485362"/>
+      </p:ext>
+    </p:extLst>
+  </p:cSld>
+  <p:clrMapOvr>
+    <a:masterClrMapping/>
+  </p:clrMapOvr>
+  <p:timing>
+    <p:tnLst>
+      <p:par>
+        <p:cTn id="1" dur="indefinite" restart="never" nodeType="tmRoot">
+          <p:childTnLst>
+            <p:seq concurrent="1" nextAc="seek">
+              <p:cTn id="2" dur="indefinite" nodeType="mainSeq">
+                <p:childTnLst>
+                  <p:par>
+                    <p:cTn id="3" fill="hold">
+                      <p:stCondLst>
+                        <p:cond delay="indefinite"/>
+                        <p:cond evt="onBegin" delay="0">
+                          <p:tn val="2"/>
+                        </p:cond>
+                      </p:stCondLst>
+                      <p:childTnLst>
+                        <p:par>
+                          <p:cTn id="4" fill="hold">
+                            <p:stCondLst>
+                              <p:cond delay="0"/>
+                            </p:stCondLst>
+                            <p:childTnLst>
+                              <p:par>
+                                <p:cTn id="5" presetID="1" presetClass="entr" presetSubtype="0" fill="hold" grpId="0" nodeType="withEffect">
+                                  <p:stCondLst>
+                                    <p:cond delay="0"/>
+                                  </p:stCondLst>
+                                  <p:childTnLst>
+                                    <p:set>
+                                      <p:cBhvr>
+                                        <p:cTn id="6" dur="1" fill="hold">
+                                          <p:stCondLst>
+                                            <p:cond delay="0"/>
+                                          </p:stCondLst>
+                                        </p:cTn>
+                                        <p:tgtEl>
+                                          <p:spTgt spid="3">
+                                            <p:txEl>
+                                              <p:pRg st="0" end="0"/>
+                                            </p:txEl>
+                                          </p:spTgt>
+                                        </p:tgtEl>
+                                        <p:attrNameLst>
+                                          <p:attrName>style.visibility</p:attrName>
+                                        </p:attrNameLst>
+                                      </p:cBhvr>
+                                      <p:to>
+                                        <p:strVal val="visible"/>
+                                      </p:to>
+                                    </p:set>
+                                  </p:childTnLst>
+                                </p:cTn>
+                              </p:par>
+                              <p:par>
+                                <p:cTn id="7" presetID="1" presetClass="entr" presetSubtype="0" fill="hold" grpId="0" nodeType="withEffect">
+                                  <p:stCondLst>
+                                    <p:cond delay="0"/>
+                                  </p:stCondLst>
+                                  <p:childTnLst>
+                                    <p:set>
+                                      <p:cBhvr>
+                                        <p:cTn id="8" dur="1" fill="hold">
+                                          <p:stCondLst>
+                                            <p:cond delay="0"/>
+                                          </p:stCondLst>
+                                        </p:cTn>
+                                        <p:tgtEl>
+                                          <p:spTgt spid="3">
+                                            <p:txEl>
+                                              <p:pRg st="1" end="1"/>
+                                            </p:txEl>
+                                          </p:spTgt>
+                                        </p:tgtEl>
+                                        <p:attrNameLst>
+                                          <p:attrName>style.visibility</p:attrName>
+                                        </p:attrNameLst>
+                                      </p:cBhvr>
+                                      <p:to>
+                                        <p:strVal val="visible"/>
+                                      </p:to>
+                                    </p:set>
+                                  </p:childTnLst>
+                                </p:cTn>
+                              </p:par>
+                            </p:childTnLst>
+                          </p:cTn>
+                        </p:par>
+                      </p:childTnLst>
+                    </p:cTn>
+                  </p:par>
+                  <p:par>
+                    <p:cTn id="9" fill="hold">
+                      <p:stCondLst>
+                        <p:cond delay="indefinite"/>
+                      </p:stCondLst>
+                      <p:childTnLst>
+                        <p:par>
+                          <p:cTn id="10" fill="hold">
+                            <p:stCondLst>
+                              <p:cond delay="0"/>
+                            </p:stCondLst>
+                            <p:childTnLst>
+                              <p:par>
+                                <p:cTn id="11" presetID="1" presetClass="entr" presetSubtype="0" fill="hold" grpId="0" nodeType="clickEffect">
+                                  <p:stCondLst>
+                                    <p:cond delay="0"/>
+                                  </p:stCondLst>
+                                  <p:childTnLst>
+                                    <p:set>
+                                      <p:cBhvr>
+                                        <p:cTn id="12" dur="1" fill="hold">
+                                          <p:stCondLst>
+                                            <p:cond delay="0"/>
+                                          </p:stCondLst>
+                                        </p:cTn>
+                                        <p:tgtEl>
+                                          <p:spTgt spid="3">
+                                            <p:txEl>
+                                              <p:pRg st="2" end="2"/>
+                                            </p:txEl>
+                                          </p:spTgt>
+                                        </p:tgtEl>
+                                        <p:attrNameLst>
+                                          <p:attrName>style.visibility</p:attrName>
+                                        </p:attrNameLst>
+                                      </p:cBhvr>
+                                      <p:to>
+                                        <p:strVal val="visible"/>
+                                      </p:to>
+                                    </p:set>
+                                  </p:childTnLst>
+                                </p:cTn>
+                              </p:par>
+                              <p:par>
+                                <p:cTn id="13" presetID="1" presetClass="entr" presetSubtype="0" fill="hold" grpId="0" nodeType="withEffect">
+                                  <p:stCondLst>
+                                    <p:cond delay="0"/>
+                                  </p:stCondLst>
+                                  <p:childTnLst>
+                                    <p:set>
+                                      <p:cBhvr>
+                                        <p:cTn id="14" dur="1" fill="hold">
+                                          <p:stCondLst>
+                                            <p:cond delay="0"/>
+                                          </p:stCondLst>
+                                        </p:cTn>
+                                        <p:tgtEl>
+                                          <p:spTgt spid="3">
+                                            <p:txEl>
+                                              <p:pRg st="3" end="3"/>
+                                            </p:txEl>
+                                          </p:spTgt>
+                                        </p:tgtEl>
+                                        <p:attrNameLst>
+                                          <p:attrName>style.visibility</p:attrName>
+                                        </p:attrNameLst>
+                                      </p:cBhvr>
+                                      <p:to>
+                                        <p:strVal val="visible"/>
+                                      </p:to>
+                                    </p:set>
+                                  </p:childTnLst>
+                                </p:cTn>
+                              </p:par>
+                            </p:childTnLst>
+                          </p:cTn>
+                        </p:par>
+                      </p:childTnLst>
+                    </p:cTn>
+                  </p:par>
+                </p:childTnLst>
+              </p:cTn>
+              <p:prevCondLst>
+                <p:cond evt="onPrev" delay="0">
+                  <p:tgtEl>
+                    <p:sldTgt/>
+                  </p:tgtEl>
+                </p:cond>
+              </p:prevCondLst>
+              <p:nextCondLst>
+                <p:cond evt="onNext" delay="0">
+                  <p:tgtEl>
+                    <p:sldTgt/>
+                  </p:tgtEl>
+                </p:cond>
+              </p:nextCondLst>
+            </p:seq>
+          </p:childTnLst>
+        </p:cTn>
+      </p:par>
+    </p:tnLst>
+    <p:bldLst>
+      <p:bldP spid="3" grpId="0" uiExpand="1" build="p"/>
+    </p:bldLst>
+  </p:timing>
+</p:sld>
+</file>
+
 <file path=ppt/slides/slide2.xml><?xml version="1.0" encoding="utf-8"?>
 <p:sld xmlns:a="http://schemas.openxmlformats.org/drawingml/2006/main" xmlns:r="http://schemas.openxmlformats.org/officeDocument/2006/relationships" xmlns:p="http://schemas.openxmlformats.org/presentationml/2006/main">
   <p:cSld>
@@ -3294,43 +4174,37 @@
       </p:sp>
       <p:grpSp>
         <p:nvGrpSpPr>
-          <p:cNvPr id="7" name="Group 6"/>
+          <p:cNvPr id="35" name="Group 34"/>
           <p:cNvGrpSpPr/>
           <p:nvPr/>
         </p:nvGrpSpPr>
         <p:grpSpPr>
           <a:xfrm>
-            <a:off x="5334000" y="4760400"/>
-            <a:ext cx="914400" cy="914400"/>
-            <a:chOff x="4191000" y="4724400"/>
-            <a:chExt cx="914400" cy="914400"/>
+            <a:off x="3444164" y="4267200"/>
+            <a:ext cx="4328236" cy="2157191"/>
+            <a:chOff x="3444164" y="4267200"/>
+            <a:chExt cx="4328236" cy="2157191"/>
           </a:xfrm>
         </p:grpSpPr>
         <p:sp>
           <p:nvSpPr>
-            <p:cNvPr id="4" name="Oval 3"/>
+            <p:cNvPr id="34" name="Rectangle 33"/>
             <p:cNvSpPr/>
             <p:nvPr/>
           </p:nvSpPr>
           <p:spPr>
             <a:xfrm>
-              <a:off x="4191000" y="4724400"/>
-              <a:ext cx="914400" cy="914400"/>
+              <a:off x="3444164" y="4267200"/>
+              <a:ext cx="4328236" cy="2157191"/>
             </a:xfrm>
-            <a:prstGeom prst="ellipse">
+            <a:prstGeom prst="rect">
               <a:avLst/>
             </a:prstGeom>
-            <a:solidFill>
-              <a:schemeClr val="accent1">
-                <a:lumMod val="20000"/>
-                <a:lumOff val="80000"/>
-              </a:schemeClr>
-            </a:solidFill>
-            <a:ln w="3175">
+            <a:noFill/>
+            <a:ln>
               <a:solidFill>
                 <a:schemeClr val="tx1"/>
               </a:solidFill>
-              <a:prstDash val="sysDash"/>
             </a:ln>
           </p:spPr>
           <p:style>
@@ -3360,7 +4234,7 @@
         </p:sp>
         <p:sp>
           <p:nvSpPr>
-            <p:cNvPr id="5" name="Oval 4"/>
+            <p:cNvPr id="17" name="Oval 16"/>
             <p:cNvSpPr>
               <a:spLocks noChangeAspect="1"/>
             </p:cNvSpPr>
@@ -3368,72 +4242,7 @@
           </p:nvSpPr>
           <p:spPr>
             <a:xfrm>
-              <a:off x="4612200" y="5145600"/>
-              <a:ext cx="72000" cy="72000"/>
-            </a:xfrm>
-            <a:prstGeom prst="ellipse">
-              <a:avLst/>
-            </a:prstGeom>
-            <a:solidFill>
-              <a:srgbClr val="C00000"/>
-            </a:solidFill>
-            <a:ln>
-              <a:solidFill>
-                <a:srgbClr val="C00000"/>
-              </a:solidFill>
-            </a:ln>
-          </p:spPr>
-          <p:style>
-            <a:lnRef idx="2">
-              <a:schemeClr val="accent1">
-                <a:shade val="50000"/>
-              </a:schemeClr>
-            </a:lnRef>
-            <a:fillRef idx="1">
-              <a:schemeClr val="accent1"/>
-            </a:fillRef>
-            <a:effectRef idx="0">
-              <a:schemeClr val="accent1"/>
-            </a:effectRef>
-            <a:fontRef idx="minor">
-              <a:schemeClr val="lt1"/>
-            </a:fontRef>
-          </p:style>
-          <p:txBody>
-            <a:bodyPr rtlCol="0" anchor="ctr"/>
-            <a:lstStyle/>
-            <a:p>
-              <a:pPr algn="ctr"/>
-              <a:endParaRPr lang="nl-BE"/>
-            </a:p>
-          </p:txBody>
-        </p:sp>
-      </p:grpSp>
-      <p:grpSp>
-        <p:nvGrpSpPr>
-          <p:cNvPr id="16" name="Group 15"/>
-          <p:cNvGrpSpPr/>
-          <p:nvPr/>
-        </p:nvGrpSpPr>
-        <p:grpSpPr>
-          <a:xfrm>
-            <a:off x="3352800" y="4419600"/>
-            <a:ext cx="4114800" cy="2209800"/>
-            <a:chOff x="2133600" y="4419600"/>
-            <a:chExt cx="4114800" cy="2209800"/>
-          </a:xfrm>
-        </p:grpSpPr>
-        <p:sp>
-          <p:nvSpPr>
-            <p:cNvPr id="6" name="Oval 5"/>
-            <p:cNvSpPr>
-              <a:spLocks noChangeAspect="1"/>
-            </p:cNvSpPr>
-            <p:nvPr/>
-          </p:nvSpPr>
-          <p:spPr>
-            <a:xfrm>
-              <a:off x="3505200" y="4876800"/>
+              <a:off x="4815764" y="4724400"/>
               <a:ext cx="72000" cy="72000"/>
             </a:xfrm>
             <a:prstGeom prst="ellipse">
@@ -3475,7 +4284,7 @@
         </p:sp>
         <p:sp>
           <p:nvSpPr>
-            <p:cNvPr id="8" name="Oval 7"/>
+            <p:cNvPr id="18" name="Oval 17"/>
             <p:cNvSpPr>
               <a:spLocks noChangeAspect="1"/>
             </p:cNvSpPr>
@@ -3483,7 +4292,7 @@
           </p:nvSpPr>
           <p:spPr>
             <a:xfrm>
-              <a:off x="2590800" y="5943600"/>
+              <a:off x="3901364" y="5791200"/>
               <a:ext cx="72000" cy="72000"/>
             </a:xfrm>
             <a:prstGeom prst="ellipse">
@@ -3525,7 +4334,7 @@
         </p:sp>
         <p:sp>
           <p:nvSpPr>
-            <p:cNvPr id="9" name="Oval 8"/>
+            <p:cNvPr id="19" name="Oval 18"/>
             <p:cNvSpPr>
               <a:spLocks noChangeAspect="1"/>
             </p:cNvSpPr>
@@ -3533,7 +4342,7 @@
           </p:nvSpPr>
           <p:spPr>
             <a:xfrm>
-              <a:off x="3657600" y="5029200"/>
+              <a:off x="4968164" y="4876800"/>
               <a:ext cx="72000" cy="72000"/>
             </a:xfrm>
             <a:prstGeom prst="ellipse">
@@ -3575,7 +4384,7 @@
         </p:sp>
         <p:sp>
           <p:nvSpPr>
-            <p:cNvPr id="10" name="Oval 9"/>
+            <p:cNvPr id="21" name="Oval 20"/>
             <p:cNvSpPr>
               <a:spLocks noChangeAspect="1"/>
             </p:cNvSpPr>
@@ -3583,7 +4392,7 @@
           </p:nvSpPr>
           <p:spPr>
             <a:xfrm>
-              <a:off x="4343400" y="4948800"/>
+              <a:off x="5653964" y="4796400"/>
               <a:ext cx="72000" cy="72000"/>
             </a:xfrm>
             <a:prstGeom prst="ellipse">
@@ -3625,7 +4434,7 @@
         </p:sp>
         <p:sp>
           <p:nvSpPr>
-            <p:cNvPr id="11" name="Oval 10"/>
+            <p:cNvPr id="22" name="Oval 21"/>
             <p:cNvSpPr>
               <a:spLocks noChangeAspect="1"/>
             </p:cNvSpPr>
@@ -3633,7 +4442,7 @@
           </p:nvSpPr>
           <p:spPr>
             <a:xfrm>
-              <a:off x="4684200" y="4912800"/>
+              <a:off x="5994764" y="4760400"/>
               <a:ext cx="72000" cy="72000"/>
             </a:xfrm>
             <a:prstGeom prst="ellipse">
@@ -3675,7 +4484,7 @@
         </p:sp>
         <p:sp>
           <p:nvSpPr>
-            <p:cNvPr id="12" name="Oval 11"/>
+            <p:cNvPr id="23" name="Oval 22"/>
             <p:cNvSpPr>
               <a:spLocks noChangeAspect="1"/>
             </p:cNvSpPr>
@@ -3683,7 +4492,7 @@
           </p:nvSpPr>
           <p:spPr>
             <a:xfrm>
-              <a:off x="4743081" y="5494800"/>
+              <a:off x="6053645" y="5342400"/>
               <a:ext cx="72000" cy="72000"/>
             </a:xfrm>
             <a:prstGeom prst="ellipse">
@@ -3725,7 +4534,7 @@
         </p:sp>
         <p:sp>
           <p:nvSpPr>
-            <p:cNvPr id="13" name="Oval 12"/>
+            <p:cNvPr id="24" name="Oval 23"/>
             <p:cNvSpPr>
               <a:spLocks noChangeAspect="1"/>
             </p:cNvSpPr>
@@ -3733,7 +4542,7 @@
           </p:nvSpPr>
           <p:spPr>
             <a:xfrm>
-              <a:off x="5105400" y="5422800"/>
+              <a:off x="6415964" y="5270400"/>
               <a:ext cx="72000" cy="72000"/>
             </a:xfrm>
             <a:prstGeom prst="ellipse">
@@ -3775,7 +4584,7 @@
         </p:sp>
         <p:sp>
           <p:nvSpPr>
-            <p:cNvPr id="14" name="Oval 13"/>
+            <p:cNvPr id="25" name="Oval 24"/>
             <p:cNvSpPr>
               <a:spLocks noChangeAspect="1"/>
             </p:cNvSpPr>
@@ -3783,7 +4592,7 @@
           </p:nvSpPr>
           <p:spPr>
             <a:xfrm>
-              <a:off x="5486400" y="4724400"/>
+              <a:off x="6796964" y="4572000"/>
               <a:ext cx="72000" cy="72000"/>
             </a:xfrm>
             <a:prstGeom prst="ellipse">
@@ -3823,24 +4632,96 @@
             </a:p>
           </p:txBody>
         </p:sp>
+      </p:grpSp>
+      <p:grpSp>
+        <p:nvGrpSpPr>
+          <p:cNvPr id="31" name="Group 30"/>
+          <p:cNvGrpSpPr/>
+          <p:nvPr/>
+        </p:nvGrpSpPr>
+        <p:grpSpPr>
+          <a:xfrm>
+            <a:off x="3712964" y="5073491"/>
+            <a:ext cx="914400" cy="914400"/>
+            <a:chOff x="4191000" y="4724400"/>
+            <a:chExt cx="914400" cy="914400"/>
+          </a:xfrm>
+        </p:grpSpPr>
         <p:sp>
           <p:nvSpPr>
-            <p:cNvPr id="15" name="Rectangle 14"/>
+            <p:cNvPr id="32" name="Oval 31"/>
             <p:cNvSpPr/>
             <p:nvPr/>
           </p:nvSpPr>
           <p:spPr>
             <a:xfrm>
-              <a:off x="2133600" y="4419600"/>
-              <a:ext cx="4114800" cy="2209800"/>
+              <a:off x="4191000" y="4724400"/>
+              <a:ext cx="914400" cy="914400"/>
             </a:xfrm>
-            <a:prstGeom prst="rect">
+            <a:prstGeom prst="ellipse">
               <a:avLst/>
             </a:prstGeom>
-            <a:noFill/>
+            <a:solidFill>
+              <a:schemeClr val="accent1">
+                <a:lumMod val="20000"/>
+                <a:lumOff val="80000"/>
+                <a:alpha val="32000"/>
+              </a:schemeClr>
+            </a:solidFill>
+            <a:ln w="3175">
+              <a:solidFill>
+                <a:schemeClr val="tx1"/>
+              </a:solidFill>
+              <a:prstDash val="sysDash"/>
+            </a:ln>
+          </p:spPr>
+          <p:style>
+            <a:lnRef idx="2">
+              <a:schemeClr val="accent1">
+                <a:shade val="50000"/>
+              </a:schemeClr>
+            </a:lnRef>
+            <a:fillRef idx="1">
+              <a:schemeClr val="accent1"/>
+            </a:fillRef>
+            <a:effectRef idx="0">
+              <a:schemeClr val="accent1"/>
+            </a:effectRef>
+            <a:fontRef idx="minor">
+              <a:schemeClr val="lt1"/>
+            </a:fontRef>
+          </p:style>
+          <p:txBody>
+            <a:bodyPr rtlCol="0" anchor="ctr"/>
+            <a:lstStyle/>
+            <a:p>
+              <a:pPr algn="ctr"/>
+              <a:endParaRPr lang="nl-BE"/>
+            </a:p>
+          </p:txBody>
+        </p:sp>
+        <p:sp>
+          <p:nvSpPr>
+            <p:cNvPr id="33" name="Oval 32"/>
+            <p:cNvSpPr>
+              <a:spLocks noChangeAspect="1"/>
+            </p:cNvSpPr>
+            <p:nvPr/>
+          </p:nvSpPr>
+          <p:spPr>
+            <a:xfrm>
+              <a:off x="4612200" y="5145600"/>
+              <a:ext cx="72000" cy="72000"/>
+            </a:xfrm>
+            <a:prstGeom prst="ellipse">
+              <a:avLst/>
+            </a:prstGeom>
+            <a:solidFill>
+              <a:srgbClr val="C00000"/>
+            </a:solidFill>
             <a:ln>
               <a:solidFill>
-                <a:schemeClr val="tx1"/>
+                <a:srgbClr val="C00000"/>
               </a:solidFill>
             </a:ln>
           </p:spPr>
@@ -4144,7 +5025,7 @@
                                           </p:stCondLst>
                                         </p:cTn>
                                         <p:tgtEl>
-                                          <p:spTgt spid="16"/>
+                                          <p:spTgt spid="35"/>
                                         </p:tgtEl>
                                         <p:attrNameLst>
                                           <p:attrName>style.visibility</p:attrName>
@@ -4189,7 +5070,7 @@
                                           </p:stCondLst>
                                         </p:cTn>
                                         <p:tgtEl>
-                                          <p:spTgt spid="7"/>
+                                          <p:spTgt spid="31"/>
                                         </p:tgtEl>
                                         <p:attrNameLst>
                                           <p:attrName>style.visibility</p:attrName>
@@ -4436,15 +5317,7 @@
           <a:p>
             <a:r>
               <a:rPr lang="en-US" dirty="0" smtClean="0"/>
-              <a:t>Too </a:t>
-            </a:r>
-            <a:r>
-              <a:rPr lang="en-US" dirty="0" smtClean="0"/>
-              <a:t>expensive in, e.g., many body </a:t>
-            </a:r>
-            <a:r>
-              <a:rPr lang="en-US" dirty="0" smtClean="0"/>
-              <a:t>simulations</a:t>
+              <a:t>Too expensive in, e.g., many body simulations</a:t>
             </a:r>
           </a:p>
           <a:p>
@@ -4952,25 +5825,13 @@
           <a:p>
             <a:r>
               <a:rPr lang="en-US" dirty="0" smtClean="0"/>
-              <a:t>E.g</a:t>
-            </a:r>
+              <a:t>E.g., 2D initialization</a:t>
+            </a:r>
+          </a:p>
+          <a:p>
             <a:r>
               <a:rPr lang="en-US" dirty="0" smtClean="0"/>
-              <a:t>., 2D </a:t>
-            </a:r>
-            <a:r>
-              <a:rPr lang="en-US" dirty="0" smtClean="0"/>
-              <a:t>initialization</a:t>
-            </a:r>
-          </a:p>
-          <a:p>
-            <a:r>
-              <a:rPr lang="en-US" dirty="0" smtClean="0"/>
-              <a:t>initialize </a:t>
-            </a:r>
-            <a:r>
-              <a:rPr lang="en-US" dirty="0" smtClean="0"/>
-              <a:t>tree with one empty region</a:t>
+              <a:t>initialize tree with one empty region</a:t>
             </a:r>
           </a:p>
           <a:p>
@@ -5035,39 +5896,6 @@
             <a:r>
               <a:rPr lang="en-US" dirty="0" smtClean="0"/>
               <a:t>else add it to bucket</a:t>
-            </a:r>
-            <a:endParaRPr lang="nl-BE" dirty="0"/>
-          </a:p>
-        </p:txBody>
-      </p:sp>
-      <p:sp>
-        <p:nvSpPr>
-          <p:cNvPr id="4" name="Rectangle 3"/>
-          <p:cNvSpPr/>
-          <p:nvPr/>
-        </p:nvSpPr>
-        <p:spPr>
-          <a:xfrm>
-            <a:off x="4402723" y="3244334"/>
-            <a:ext cx="338554" cy="369332"/>
-          </a:xfrm>
-          <a:prstGeom prst="rect">
-            <a:avLst/>
-          </a:prstGeom>
-        </p:spPr>
-        <p:txBody>
-          <a:bodyPr wrap="none">
-            <a:spAutoFit/>
-          </a:bodyPr>
-          <a:lstStyle/>
-          <a:p>
-            <a:r>
-              <a:rPr lang="en-US" i="1" dirty="0"/>
-              <a:t>p</a:t>
-            </a:r>
-            <a:r>
-              <a:rPr lang="en-US" i="1" baseline="-25000" dirty="0"/>
-              <a:t>i</a:t>
             </a:r>
             <a:endParaRPr lang="nl-BE" dirty="0"/>
           </a:p>
@@ -8939,12 +9767,12 @@
               <a:t>if query </a:t>
             </a:r>
             <a:r>
-              <a:rPr lang="en-US" dirty="0" err="1" smtClean="0"/>
-              <a:t>can not</a:t>
-            </a:r>
-            <a:r>
               <a:rPr lang="en-US" dirty="0" smtClean="0"/>
-              <a:t> return points in region, stop</a:t>
+              <a:t>cannot </a:t>
+            </a:r>
+            <a:r>
+              <a:rPr lang="en-US" dirty="0" smtClean="0"/>
+              <a:t>return points in region, stop</a:t>
             </a:r>
           </a:p>
           <a:p>

</xml_diff>

<commit_message>
Fixed size of plot labels; added some more visual aids
</commit_message>
<xml_diff>
--- a/C/Tree_2k/tree_2k.pptx
+++ b/C/Tree_2k/tree_2k.pptx
@@ -115,6 +115,22 @@
       </a:defRPr>
     </a:lvl9pPr>
   </p:defaultTextStyle>
+  <p:extLst>
+    <p:ext uri="{EFAFB233-063F-42B5-8137-9DF3F51BA10A}">
+      <p15:sldGuideLst xmlns:p15="http://schemas.microsoft.com/office/powerpoint/2012/main">
+        <p15:guide id="1" orient="horz" pos="2160">
+          <p15:clr>
+            <a:srgbClr val="A4A3A4"/>
+          </p15:clr>
+        </p15:guide>
+        <p15:guide id="2" pos="2880">
+          <p15:clr>
+            <a:srgbClr val="A4A3A4"/>
+          </p15:clr>
+        </p15:guide>
+      </p15:sldGuideLst>
+    </p:ext>
+  </p:extLst>
 </p:presentation>
 </file>
 
@@ -300,7 +316,7 @@
             <a:fld id="{1D8BD707-D9CF-40AE-B4C6-C98DA3205C09}" type="datetimeFigureOut">
               <a:rPr lang="en-US" smtClean="0"/>
               <a:pPr/>
-              <a:t>2016-01-14</a:t>
+              <a:t>2017-04-21</a:t>
             </a:fld>
             <a:endParaRPr lang="en-US"/>
           </a:p>
@@ -467,7 +483,7 @@
             <a:fld id="{1D8BD707-D9CF-40AE-B4C6-C98DA3205C09}" type="datetimeFigureOut">
               <a:rPr lang="en-US" smtClean="0"/>
               <a:pPr/>
-              <a:t>2016-01-14</a:t>
+              <a:t>2017-04-21</a:t>
             </a:fld>
             <a:endParaRPr lang="en-US"/>
           </a:p>
@@ -644,7 +660,7 @@
             <a:fld id="{1D8BD707-D9CF-40AE-B4C6-C98DA3205C09}" type="datetimeFigureOut">
               <a:rPr lang="en-US" smtClean="0"/>
               <a:pPr/>
-              <a:t>2016-01-14</a:t>
+              <a:t>2017-04-21</a:t>
             </a:fld>
             <a:endParaRPr lang="en-US"/>
           </a:p>
@@ -811,7 +827,7 @@
             <a:fld id="{1D8BD707-D9CF-40AE-B4C6-C98DA3205C09}" type="datetimeFigureOut">
               <a:rPr lang="en-US" smtClean="0"/>
               <a:pPr/>
-              <a:t>2016-01-14</a:t>
+              <a:t>2017-04-21</a:t>
             </a:fld>
             <a:endParaRPr lang="en-US"/>
           </a:p>
@@ -1054,7 +1070,7 @@
             <a:fld id="{1D8BD707-D9CF-40AE-B4C6-C98DA3205C09}" type="datetimeFigureOut">
               <a:rPr lang="en-US" smtClean="0"/>
               <a:pPr/>
-              <a:t>2016-01-14</a:t>
+              <a:t>2017-04-21</a:t>
             </a:fld>
             <a:endParaRPr lang="en-US"/>
           </a:p>
@@ -1339,7 +1355,7 @@
             <a:fld id="{1D8BD707-D9CF-40AE-B4C6-C98DA3205C09}" type="datetimeFigureOut">
               <a:rPr lang="en-US" smtClean="0"/>
               <a:pPr/>
-              <a:t>2016-01-14</a:t>
+              <a:t>2017-04-21</a:t>
             </a:fld>
             <a:endParaRPr lang="en-US"/>
           </a:p>
@@ -1758,7 +1774,7 @@
             <a:fld id="{1D8BD707-D9CF-40AE-B4C6-C98DA3205C09}" type="datetimeFigureOut">
               <a:rPr lang="en-US" smtClean="0"/>
               <a:pPr/>
-              <a:t>2016-01-14</a:t>
+              <a:t>2017-04-21</a:t>
             </a:fld>
             <a:endParaRPr lang="en-US"/>
           </a:p>
@@ -1873,7 +1889,7 @@
             <a:fld id="{1D8BD707-D9CF-40AE-B4C6-C98DA3205C09}" type="datetimeFigureOut">
               <a:rPr lang="en-US" smtClean="0"/>
               <a:pPr/>
-              <a:t>2016-01-14</a:t>
+              <a:t>2017-04-21</a:t>
             </a:fld>
             <a:endParaRPr lang="en-US"/>
           </a:p>
@@ -1965,7 +1981,7 @@
             <a:fld id="{1D8BD707-D9CF-40AE-B4C6-C98DA3205C09}" type="datetimeFigureOut">
               <a:rPr lang="en-US" smtClean="0"/>
               <a:pPr/>
-              <a:t>2016-01-14</a:t>
+              <a:t>2017-04-21</a:t>
             </a:fld>
             <a:endParaRPr lang="en-US"/>
           </a:p>
@@ -2239,7 +2255,7 @@
             <a:fld id="{1D8BD707-D9CF-40AE-B4C6-C98DA3205C09}" type="datetimeFigureOut">
               <a:rPr lang="en-US" smtClean="0"/>
               <a:pPr/>
-              <a:t>2016-01-14</a:t>
+              <a:t>2017-04-21</a:t>
             </a:fld>
             <a:endParaRPr lang="en-US"/>
           </a:p>
@@ -2489,7 +2505,7 @@
             <a:fld id="{1D8BD707-D9CF-40AE-B4C6-C98DA3205C09}" type="datetimeFigureOut">
               <a:rPr lang="en-US" smtClean="0"/>
               <a:pPr/>
-              <a:t>2016-01-14</a:t>
+              <a:t>2017-04-21</a:t>
             </a:fld>
             <a:endParaRPr lang="en-US"/>
           </a:p>
@@ -2699,7 +2715,7 @@
             <a:fld id="{1D8BD707-D9CF-40AE-B4C6-C98DA3205C09}" type="datetimeFigureOut">
               <a:rPr lang="en-US" smtClean="0"/>
               <a:pPr/>
-              <a:t>2016-01-14</a:t>
+              <a:t>2017-04-21</a:t>
             </a:fld>
             <a:endParaRPr lang="en-US"/>
           </a:p>
@@ -3241,6 +3257,70 @@
           </a:prstGeom>
         </p:spPr>
       </p:pic>
+      <p:sp>
+        <p:nvSpPr>
+          <p:cNvPr id="5" name="TextBox 4"/>
+          <p:cNvSpPr txBox="1"/>
+          <p:nvPr/>
+        </p:nvSpPr>
+        <p:spPr>
+          <a:xfrm>
+            <a:off x="3619515" y="6519857"/>
+            <a:ext cx="1447769" cy="307777"/>
+          </a:xfrm>
+          <a:prstGeom prst="rect">
+            <a:avLst/>
+          </a:prstGeom>
+          <a:solidFill>
+            <a:schemeClr val="bg1"/>
+          </a:solidFill>
+        </p:spPr>
+        <p:txBody>
+          <a:bodyPr wrap="none" rtlCol="0">
+            <a:spAutoFit/>
+          </a:bodyPr>
+          <a:lstStyle/>
+          <a:p>
+            <a:r>
+              <a:rPr lang="en-US" sz="1400" dirty="0" smtClean="0"/>
+              <a:t>number of points</a:t>
+            </a:r>
+            <a:endParaRPr lang="en-US" sz="1400" dirty="0"/>
+          </a:p>
+        </p:txBody>
+      </p:sp>
+      <p:sp>
+        <p:nvSpPr>
+          <p:cNvPr id="6" name="TextBox 5"/>
+          <p:cNvSpPr txBox="1"/>
+          <p:nvPr/>
+        </p:nvSpPr>
+        <p:spPr>
+          <a:xfrm rot="16200000" flipH="1">
+            <a:off x="384109" y="4136914"/>
+            <a:ext cx="1517788" cy="307777"/>
+          </a:xfrm>
+          <a:prstGeom prst="rect">
+            <a:avLst/>
+          </a:prstGeom>
+          <a:solidFill>
+            <a:schemeClr val="bg1"/>
+          </a:solidFill>
+        </p:spPr>
+        <p:txBody>
+          <a:bodyPr wrap="none" rtlCol="0">
+            <a:spAutoFit/>
+          </a:bodyPr>
+          <a:lstStyle/>
+          <a:p>
+            <a:r>
+              <a:rPr lang="en-US" sz="1400" dirty="0" smtClean="0"/>
+              <a:t>time for inserts (s)</a:t>
+            </a:r>
+            <a:endParaRPr lang="en-US" sz="1400" dirty="0"/>
+          </a:p>
+        </p:txBody>
+      </p:sp>
     </p:spTree>
     <p:extLst>
       <p:ext uri="{BB962C8B-B14F-4D97-AF65-F5344CB8AC3E}">
@@ -9764,15 +9844,7 @@
             <a:pPr lvl="1"/>
             <a:r>
               <a:rPr lang="en-US" dirty="0" smtClean="0"/>
-              <a:t>if query </a:t>
-            </a:r>
-            <a:r>
-              <a:rPr lang="en-US" dirty="0" smtClean="0"/>
-              <a:t>cannot </a:t>
-            </a:r>
-            <a:r>
-              <a:rPr lang="en-US" dirty="0" smtClean="0"/>
-              <a:t>return points in region, stop</a:t>
+              <a:t>if query cannot return points in region, stop</a:t>
             </a:r>
           </a:p>
           <a:p>
@@ -9974,45 +10046,6 @@
           </a:prstGeom>
         </p:spPr>
       </p:pic>
-      <p:sp>
-        <p:nvSpPr>
-          <p:cNvPr id="7" name="TextBox 6"/>
-          <p:cNvSpPr txBox="1"/>
-          <p:nvPr/>
-        </p:nvSpPr>
-        <p:spPr>
-          <a:xfrm>
-            <a:off x="176239" y="4876800"/>
-            <a:ext cx="3024161" cy="461665"/>
-          </a:xfrm>
-          <a:prstGeom prst="rect">
-            <a:avLst/>
-          </a:prstGeom>
-          <a:solidFill>
-            <a:srgbClr val="FF0000">
-              <a:alpha val="24000"/>
-            </a:srgbClr>
-          </a:solidFill>
-          <a:ln>
-            <a:solidFill>
-              <a:srgbClr val="FF0000"/>
-            </a:solidFill>
-          </a:ln>
-        </p:spPr>
-        <p:txBody>
-          <a:bodyPr wrap="none" rtlCol="0">
-            <a:spAutoFit/>
-          </a:bodyPr>
-          <a:lstStyle/>
-          <a:p>
-            <a:r>
-              <a:rPr lang="en-US" sz="2400" dirty="0" smtClean="0"/>
-              <a:t>Can be a factor of 100!</a:t>
-            </a:r>
-            <a:endParaRPr lang="nl-BE" sz="2400" dirty="0"/>
-          </a:p>
-        </p:txBody>
-      </p:sp>
       <p:cxnSp>
         <p:nvCxnSpPr>
           <p:cNvPr id="9" name="Straight Connector 8"/>
@@ -10085,6 +10118,295 @@
           </a:fontRef>
         </p:style>
       </p:cxnSp>
+      <p:sp>
+        <p:nvSpPr>
+          <p:cNvPr id="4" name="TextBox 3"/>
+          <p:cNvSpPr txBox="1"/>
+          <p:nvPr/>
+        </p:nvSpPr>
+        <p:spPr>
+          <a:xfrm>
+            <a:off x="4856194" y="6083867"/>
+            <a:ext cx="2801729" cy="307777"/>
+          </a:xfrm>
+          <a:prstGeom prst="rect">
+            <a:avLst/>
+          </a:prstGeom>
+          <a:solidFill>
+            <a:schemeClr val="bg1"/>
+          </a:solidFill>
+        </p:spPr>
+        <p:txBody>
+          <a:bodyPr wrap="none" rtlCol="0">
+            <a:spAutoFit/>
+          </a:bodyPr>
+          <a:lstStyle/>
+          <a:p>
+            <a:r>
+              <a:rPr lang="en-US" sz="1400" dirty="0" smtClean="0"/>
+              <a:t>fraction of points returned by query</a:t>
+            </a:r>
+            <a:endParaRPr lang="en-US" sz="1400" dirty="0"/>
+          </a:p>
+        </p:txBody>
+      </p:sp>
+      <p:sp>
+        <p:nvSpPr>
+          <p:cNvPr id="5" name="TextBox 4"/>
+          <p:cNvSpPr txBox="1"/>
+          <p:nvPr/>
+        </p:nvSpPr>
+        <p:spPr>
+          <a:xfrm rot="16200000" flipH="1">
+            <a:off x="1469468" y="3153504"/>
+            <a:ext cx="3095206" cy="307777"/>
+          </a:xfrm>
+          <a:prstGeom prst="rect">
+            <a:avLst/>
+          </a:prstGeom>
+          <a:solidFill>
+            <a:schemeClr val="bg1"/>
+          </a:solidFill>
+        </p:spPr>
+        <p:txBody>
+          <a:bodyPr wrap="none" rtlCol="0">
+            <a:spAutoFit/>
+          </a:bodyPr>
+          <a:lstStyle/>
+          <a:p>
+            <a:r>
+              <a:rPr lang="en-US" sz="1400" dirty="0" smtClean="0"/>
+              <a:t>ratio of naïve versus tree_2k query time</a:t>
+            </a:r>
+            <a:endParaRPr lang="en-US" sz="1400" dirty="0"/>
+          </a:p>
+        </p:txBody>
+      </p:sp>
+      <p:sp>
+        <p:nvSpPr>
+          <p:cNvPr id="8" name="Rectangle 7"/>
+          <p:cNvSpPr/>
+          <p:nvPr/>
+        </p:nvSpPr>
+        <p:spPr>
+          <a:xfrm>
+            <a:off x="7239000" y="2514600"/>
+            <a:ext cx="1752600" cy="3352800"/>
+          </a:xfrm>
+          <a:prstGeom prst="rect">
+            <a:avLst/>
+          </a:prstGeom>
+          <a:pattFill prst="wdUpDiag">
+            <a:fgClr>
+              <a:srgbClr val="FF0000"/>
+            </a:fgClr>
+            <a:bgClr>
+              <a:schemeClr val="bg1"/>
+            </a:bgClr>
+          </a:pattFill>
+          <a:ln>
+            <a:noFill/>
+          </a:ln>
+        </p:spPr>
+        <p:style>
+          <a:lnRef idx="2">
+            <a:schemeClr val="accent1">
+              <a:shade val="50000"/>
+            </a:schemeClr>
+          </a:lnRef>
+          <a:fillRef idx="1">
+            <a:schemeClr val="accent1"/>
+          </a:fillRef>
+          <a:effectRef idx="0">
+            <a:schemeClr val="accent1"/>
+          </a:effectRef>
+          <a:fontRef idx="minor">
+            <a:schemeClr val="lt1"/>
+          </a:fontRef>
+        </p:style>
+        <p:txBody>
+          <a:bodyPr rtlCol="0" anchor="ctr"/>
+          <a:lstStyle/>
+          <a:p>
+            <a:pPr algn="ctr"/>
+            <a:endParaRPr lang="en-US"/>
+          </a:p>
+        </p:txBody>
+      </p:sp>
+      <p:grpSp>
+        <p:nvGrpSpPr>
+          <p:cNvPr id="16" name="Group 15"/>
+          <p:cNvGrpSpPr/>
+          <p:nvPr/>
+        </p:nvGrpSpPr>
+        <p:grpSpPr>
+          <a:xfrm>
+            <a:off x="6247064" y="5153799"/>
+            <a:ext cx="936977" cy="713601"/>
+            <a:chOff x="6247064" y="5153799"/>
+            <a:chExt cx="936977" cy="713601"/>
+          </a:xfrm>
+        </p:grpSpPr>
+        <p:sp>
+          <p:nvSpPr>
+            <p:cNvPr id="10" name="TextBox 9"/>
+            <p:cNvSpPr txBox="1"/>
+            <p:nvPr/>
+          </p:nvSpPr>
+          <p:spPr>
+            <a:xfrm>
+              <a:off x="6247064" y="5153799"/>
+              <a:ext cx="636713" cy="369332"/>
+            </a:xfrm>
+            <a:prstGeom prst="rect">
+              <a:avLst/>
+            </a:prstGeom>
+            <a:noFill/>
+          </p:spPr>
+          <p:txBody>
+            <a:bodyPr wrap="none" rtlCol="0">
+              <a:spAutoFit/>
+            </a:bodyPr>
+            <a:lstStyle/>
+            <a:p>
+              <a:r>
+                <a:rPr lang="en-US" dirty="0" smtClean="0"/>
+                <a:t>10 %</a:t>
+              </a:r>
+              <a:endParaRPr lang="en-US" dirty="0"/>
+            </a:p>
+          </p:txBody>
+        </p:sp>
+        <p:cxnSp>
+          <p:nvCxnSpPr>
+            <p:cNvPr id="13" name="Straight Arrow Connector 12"/>
+            <p:cNvCxnSpPr>
+              <a:stCxn id="10" idx="2"/>
+            </p:cNvCxnSpPr>
+            <p:nvPr/>
+          </p:nvCxnSpPr>
+          <p:spPr>
+            <a:xfrm>
+              <a:off x="6565421" y="5523131"/>
+              <a:ext cx="618620" cy="344269"/>
+            </a:xfrm>
+            <a:prstGeom prst="straightConnector1">
+              <a:avLst/>
+            </a:prstGeom>
+            <a:ln>
+              <a:solidFill>
+                <a:schemeClr val="tx1"/>
+              </a:solidFill>
+              <a:tailEnd type="stealth" w="lg" len="lg"/>
+            </a:ln>
+          </p:spPr>
+          <p:style>
+            <a:lnRef idx="1">
+              <a:schemeClr val="accent1"/>
+            </a:lnRef>
+            <a:fillRef idx="0">
+              <a:schemeClr val="accent1"/>
+            </a:fillRef>
+            <a:effectRef idx="0">
+              <a:schemeClr val="accent1"/>
+            </a:effectRef>
+            <a:fontRef idx="minor">
+              <a:schemeClr val="tx1"/>
+            </a:fontRef>
+          </p:style>
+        </p:cxnSp>
+      </p:grpSp>
+      <p:grpSp>
+        <p:nvGrpSpPr>
+          <p:cNvPr id="19" name="Group 18"/>
+          <p:cNvGrpSpPr/>
+          <p:nvPr/>
+        </p:nvGrpSpPr>
+        <p:grpSpPr>
+          <a:xfrm>
+            <a:off x="838200" y="2353607"/>
+            <a:ext cx="3200400" cy="2984858"/>
+            <a:chOff x="838200" y="2353607"/>
+            <a:chExt cx="3200400" cy="2984858"/>
+          </a:xfrm>
+        </p:grpSpPr>
+        <p:sp>
+          <p:nvSpPr>
+            <p:cNvPr id="7" name="TextBox 6"/>
+            <p:cNvSpPr txBox="1"/>
+            <p:nvPr/>
+          </p:nvSpPr>
+          <p:spPr>
+            <a:xfrm>
+              <a:off x="838200" y="4876800"/>
+              <a:ext cx="3024161" cy="461665"/>
+            </a:xfrm>
+            <a:prstGeom prst="rect">
+              <a:avLst/>
+            </a:prstGeom>
+            <a:solidFill>
+              <a:srgbClr val="FF0000">
+                <a:alpha val="24000"/>
+              </a:srgbClr>
+            </a:solidFill>
+            <a:ln>
+              <a:solidFill>
+                <a:srgbClr val="FF0000"/>
+              </a:solidFill>
+            </a:ln>
+          </p:spPr>
+          <p:txBody>
+            <a:bodyPr wrap="none" rtlCol="0">
+              <a:spAutoFit/>
+            </a:bodyPr>
+            <a:lstStyle/>
+            <a:p>
+              <a:r>
+                <a:rPr lang="en-US" sz="2400" dirty="0" smtClean="0"/>
+                <a:t>Can be a factor of 100!</a:t>
+              </a:r>
+              <a:endParaRPr lang="nl-BE" sz="2400" dirty="0"/>
+            </a:p>
+          </p:txBody>
+        </p:sp>
+        <p:cxnSp>
+          <p:nvCxnSpPr>
+            <p:cNvPr id="18" name="Straight Arrow Connector 17"/>
+            <p:cNvCxnSpPr/>
+            <p:nvPr/>
+          </p:nvCxnSpPr>
+          <p:spPr>
+            <a:xfrm>
+              <a:off x="4038600" y="2353607"/>
+              <a:ext cx="0" cy="2218393"/>
+            </a:xfrm>
+            <a:prstGeom prst="straightConnector1">
+              <a:avLst/>
+            </a:prstGeom>
+            <a:ln w="60325">
+              <a:solidFill>
+                <a:srgbClr val="C00000"/>
+              </a:solidFill>
+              <a:headEnd type="stealth" w="lg" len="lg"/>
+              <a:tailEnd type="stealth" w="lg" len="lg"/>
+            </a:ln>
+          </p:spPr>
+          <p:style>
+            <a:lnRef idx="1">
+              <a:schemeClr val="accent1"/>
+            </a:lnRef>
+            <a:fillRef idx="0">
+              <a:schemeClr val="accent1"/>
+            </a:fillRef>
+            <a:effectRef idx="0">
+              <a:schemeClr val="accent1"/>
+            </a:effectRef>
+            <a:fontRef idx="minor">
+              <a:schemeClr val="tx1"/>
+            </a:fontRef>
+          </p:style>
+        </p:cxnSp>
+      </p:grpSp>
     </p:spTree>
     <p:extLst>
       <p:ext uri="{BB962C8B-B14F-4D97-AF65-F5344CB8AC3E}">
@@ -10266,7 +10588,7 @@
                             </p:stCondLst>
                             <p:childTnLst>
                               <p:par>
-                                <p:cTn id="17" presetID="1" presetClass="entr" presetSubtype="0" fill="hold" grpId="0" nodeType="clickEffect">
+                                <p:cTn id="17" presetID="1" presetClass="entr" presetSubtype="0" fill="hold" nodeType="clickEffect">
                                   <p:stCondLst>
                                     <p:cond delay="0"/>
                                   </p:stCondLst>
@@ -10279,7 +10601,105 @@
                                           </p:stCondLst>
                                         </p:cTn>
                                         <p:tgtEl>
-                                          <p:spTgt spid="7"/>
+                                          <p:spTgt spid="19"/>
+                                        </p:tgtEl>
+                                        <p:attrNameLst>
+                                          <p:attrName>style.visibility</p:attrName>
+                                        </p:attrNameLst>
+                                      </p:cBhvr>
+                                      <p:to>
+                                        <p:strVal val="visible"/>
+                                      </p:to>
+                                    </p:set>
+                                  </p:childTnLst>
+                                </p:cTn>
+                              </p:par>
+                            </p:childTnLst>
+                          </p:cTn>
+                        </p:par>
+                      </p:childTnLst>
+                    </p:cTn>
+                  </p:par>
+                  <p:par>
+                    <p:cTn id="19" fill="hold">
+                      <p:stCondLst>
+                        <p:cond delay="indefinite"/>
+                      </p:stCondLst>
+                      <p:childTnLst>
+                        <p:par>
+                          <p:cTn id="20" fill="hold">
+                            <p:stCondLst>
+                              <p:cond delay="0"/>
+                            </p:stCondLst>
+                            <p:childTnLst>
+                              <p:par>
+                                <p:cTn id="21" presetID="10" presetClass="entr" presetSubtype="0" fill="hold" grpId="0" nodeType="clickEffect">
+                                  <p:stCondLst>
+                                    <p:cond delay="0"/>
+                                  </p:stCondLst>
+                                  <p:childTnLst>
+                                    <p:set>
+                                      <p:cBhvr>
+                                        <p:cTn id="22" dur="1" fill="hold">
+                                          <p:stCondLst>
+                                            <p:cond delay="0"/>
+                                          </p:stCondLst>
+                                        </p:cTn>
+                                        <p:tgtEl>
+                                          <p:spTgt spid="8"/>
+                                        </p:tgtEl>
+                                        <p:attrNameLst>
+                                          <p:attrName>style.visibility</p:attrName>
+                                        </p:attrNameLst>
+                                      </p:cBhvr>
+                                      <p:to>
+                                        <p:strVal val="visible"/>
+                                      </p:to>
+                                    </p:set>
+                                    <p:animEffect transition="in" filter="fade">
+                                      <p:cBhvr>
+                                        <p:cTn id="23" dur="500"/>
+                                        <p:tgtEl>
+                                          <p:spTgt spid="8"/>
+                                        </p:tgtEl>
+                                      </p:cBhvr>
+                                    </p:animEffect>
+                                  </p:childTnLst>
+                                </p:cTn>
+                              </p:par>
+                            </p:childTnLst>
+                          </p:cTn>
+                        </p:par>
+                      </p:childTnLst>
+                    </p:cTn>
+                  </p:par>
+                  <p:par>
+                    <p:cTn id="24" fill="hold">
+                      <p:stCondLst>
+                        <p:cond delay="indefinite"/>
+                      </p:stCondLst>
+                      <p:childTnLst>
+                        <p:par>
+                          <p:cTn id="25" fill="hold">
+                            <p:stCondLst>
+                              <p:cond delay="0"/>
+                            </p:stCondLst>
+                            <p:childTnLst>
+                              <p:par>
+                                <p:cTn id="26" presetID="1" presetClass="entr" presetSubtype="0" fill="hold" nodeType="clickEffect">
+                                  <p:stCondLst>
+                                    <p:cond delay="0"/>
+                                  </p:stCondLst>
+                                  <p:childTnLst>
+                                    <p:set>
+                                      <p:cBhvr>
+                                        <p:cTn id="27" dur="1" fill="hold">
+                                          <p:stCondLst>
+                                            <p:cond delay="0"/>
+                                          </p:stCondLst>
+                                        </p:cTn>
+                                        <p:tgtEl>
+                                          <p:spTgt spid="16"/>
                                         </p:tgtEl>
                                         <p:attrNameLst>
                                           <p:attrName>style.visibility</p:attrName>
@@ -10321,7 +10741,7 @@
     </p:tnLst>
     <p:bldLst>
       <p:bldP spid="3" grpId="0" uiExpand="1" build="p" bldLvl="2"/>
-      <p:bldP spid="7" grpId="0" animBg="1"/>
+      <p:bldP spid="8" grpId="0" animBg="1"/>
     </p:bldLst>
   </p:timing>
 </p:sld>

</xml_diff>